<commit_message>
CV results: type(linear,edit,subseq) family(linear)
</commit_message>
<xml_diff>
--- a/poster/poster.pptx
+++ b/poster/poster.pptx
@@ -4502,6 +4502,71 @@
           <a:noFill/>
         </p:spPr>
       </p:pic>
+      <p:sp>
+        <p:nvSpPr>
+          <p:cNvPr id="6" name="TextBox 5"/>
+          <p:cNvSpPr txBox="1"/>
+          <p:nvPr/>
+        </p:nvSpPr>
+        <p:spPr>
+          <a:xfrm>
+            <a:off x="5280212" y="3836894"/>
+            <a:ext cx="3702423" cy="2862322"/>
+          </a:xfrm>
+          <a:prstGeom prst="rect">
+            <a:avLst/>
+          </a:prstGeom>
+        </p:spPr>
+        <p:style>
+          <a:lnRef idx="1">
+            <a:schemeClr val="accent3"/>
+          </a:lnRef>
+          <a:fillRef idx="2">
+            <a:schemeClr val="accent3"/>
+          </a:fillRef>
+          <a:effectRef idx="1">
+            <a:schemeClr val="accent3"/>
+          </a:effectRef>
+          <a:fontRef idx="minor">
+            <a:schemeClr val="dk1"/>
+          </a:fontRef>
+        </p:style>
+        <p:txBody>
+          <a:bodyPr wrap="square" rtlCol="0">
+            <a:spAutoFit/>
+          </a:bodyPr>
+          <a:lstStyle/>
+          <a:p>
+            <a:r>
+              <a:rPr lang="en-US" b="1" u="sng" dirty="0" smtClean="0"/>
+              <a:t>Problems with Std. Approaches:</a:t>
+            </a:r>
+          </a:p>
+          <a:p>
+            <a:r>
+              <a:rPr lang="en-US" dirty="0" smtClean="0"/>
+              <a:t>Many user agents attempt to deceive the server parsing engine in order to get specific content, i.e. pages optimized for </a:t>
+            </a:r>
+            <a:r>
+              <a:rPr lang="en-US" smtClean="0"/>
+              <a:t>GoogleBot</a:t>
+            </a:r>
+            <a:r>
+              <a:rPr lang="en-US" dirty="0" smtClean="0"/>
+              <a:t>, by adding specific tokens to the UA string.  A hierarchal </a:t>
+            </a:r>
+            <a:r>
+              <a:rPr lang="en-US" dirty="0" err="1" smtClean="0"/>
+              <a:t>regexp</a:t>
+            </a:r>
+            <a:r>
+              <a:rPr lang="en-US" dirty="0" smtClean="0"/>
+              <a:t> engine will be confused by such additions.  A discriminative algorithm may still classify the modified string correctly.</a:t>
+            </a:r>
+            <a:endParaRPr lang="en-US" dirty="0" smtClean="0"/>
+          </a:p>
+        </p:txBody>
+      </p:sp>
     </p:spTree>
   </p:cSld>
   <p:clrMapOvr>

</xml_diff>

<commit_message>
poster rough draft added PDF
</commit_message>
<xml_diff>
--- a/poster/poster.pptx
+++ b/poster/poster.pptx
@@ -13,7 +13,7 @@
     <p:sldId id="261" r:id="rId7"/>
   </p:sldIdLst>
   <p:sldSz cx="9144000" cy="6858000" type="screen4x3"/>
-  <p:notesSz cx="6858000" cy="9144000"/>
+  <p:notesSz cx="7315200" cy="9601200"/>
   <p:defaultTextStyle>
     <a:defPPr>
       <a:defRPr lang="en-US"/>
@@ -3498,8 +3498,8 @@
         </p:nvSpPr>
         <p:spPr>
           <a:xfrm>
-            <a:off x="446926" y="0"/>
-            <a:ext cx="8229600" cy="1143000"/>
+            <a:off x="1604683" y="0"/>
+            <a:ext cx="5961529" cy="1102659"/>
           </a:xfrm>
         </p:spPr>
         <p:txBody>
@@ -4158,49 +4158,7 @@
                 <a:latin typeface="Arial" pitchFamily="34" charset="0"/>
                 <a:cs typeface="Arial" pitchFamily="34" charset="0"/>
               </a:rPr>
-              <a:t>Mozilla/4.0 </a:t>
-            </a:r>
-            <a:r>
-              <a:rPr lang="en-US" sz="1200" b="1" dirty="0" smtClean="0">
-                <a:latin typeface="Arial" pitchFamily="34" charset="0"/>
-                <a:cs typeface="Arial" pitchFamily="34" charset="0"/>
-              </a:rPr>
-              <a:t>(compatible; MSIE 5.01; Windows NT 5.0; SV1; .NET </a:t>
-            </a:r>
-            <a:r>
-              <a:rPr lang="en-US" sz="1200" b="1" dirty="0" smtClean="0">
-                <a:latin typeface="Arial" pitchFamily="34" charset="0"/>
-                <a:cs typeface="Arial" pitchFamily="34" charset="0"/>
-              </a:rPr>
-              <a:t>CLR 1.1.4322</a:t>
-            </a:r>
-            <a:r>
-              <a:rPr lang="en-US" sz="1200" b="1" dirty="0" smtClean="0">
-                <a:latin typeface="Arial" pitchFamily="34" charset="0"/>
-                <a:cs typeface="Arial" pitchFamily="34" charset="0"/>
-              </a:rPr>
-              <a:t>; .NET CLR 1.0.3705; .</a:t>
-            </a:r>
-            <a:r>
-              <a:rPr lang="en-US" sz="1200" b="1" dirty="0" smtClean="0">
-                <a:latin typeface="Arial" pitchFamily="34" charset="0"/>
-                <a:cs typeface="Arial" pitchFamily="34" charset="0"/>
-              </a:rPr>
-              <a:t>NET CLR </a:t>
-            </a:r>
-            <a:r>
-              <a:rPr lang="en-US" sz="1200" b="1" dirty="0" smtClean="0">
-                <a:latin typeface="Arial" pitchFamily="34" charset="0"/>
-                <a:cs typeface="Arial" pitchFamily="34" charset="0"/>
-              </a:rPr>
-              <a:t>2.0.50727</a:t>
-            </a:r>
-            <a:r>
-              <a:rPr lang="en-US" sz="1200" b="1" dirty="0" smtClean="0">
-                <a:latin typeface="Arial" pitchFamily="34" charset="0"/>
-                <a:cs typeface="Arial" pitchFamily="34" charset="0"/>
-              </a:rPr>
-              <a:t>)</a:t>
+              <a:t>Mozilla/4.0 (compatible; MSIE 5.01; Windows NT 5.0; SV1; .NET CLR 1.1.4322; .NET CLR 1.0.3705; .NET CLR 2.0.50727)</a:t>
             </a:r>
           </a:p>
           <a:p>
@@ -4223,14 +4181,7 @@
                 <a:latin typeface="Arial" pitchFamily="34" charset="0"/>
                 <a:cs typeface="Arial" pitchFamily="34" charset="0"/>
               </a:rPr>
-              <a:t>/2.1; http://www.google.com/bot.html</a:t>
-            </a:r>
-            <a:r>
-              <a:rPr lang="en-US" sz="1200" b="1" dirty="0" smtClean="0">
-                <a:latin typeface="Arial" pitchFamily="34" charset="0"/>
-                <a:cs typeface="Arial" pitchFamily="34" charset="0"/>
-              </a:rPr>
-              <a:t>)</a:t>
+              <a:t>/2.1; http://www.google.com/bot.html)</a:t>
             </a:r>
           </a:p>
           <a:p>
@@ -4262,14 +4213,7 @@
                 <a:latin typeface="Arial" pitchFamily="34" charset="0"/>
                 <a:cs typeface="Arial" pitchFamily="34" charset="0"/>
               </a:rPr>
-              <a:t> 3.0.5</a:t>
-            </a:r>
-            <a:r>
-              <a:rPr lang="en-US" sz="1200" b="1" dirty="0" smtClean="0">
-                <a:latin typeface="Arial" pitchFamily="34" charset="0"/>
-                <a:cs typeface="Arial" pitchFamily="34" charset="0"/>
-              </a:rPr>
-              <a:t>)</a:t>
+              <a:t> 3.0.5)</a:t>
             </a:r>
           </a:p>
           <a:p>
@@ -4287,10 +4231,6 @@
               </a:rPr>
               <a:t>+(+http://help.baidu.jp/system/05.html)</a:t>
             </a:r>
-            <a:endParaRPr lang="en-US" sz="1200" b="1" dirty="0" smtClean="0">
-              <a:latin typeface="Arial" pitchFamily="34" charset="0"/>
-              <a:cs typeface="Arial" pitchFamily="34" charset="0"/>
-            </a:endParaRPr>
           </a:p>
           <a:p>
             <a:endParaRPr lang="en-US" sz="1200" b="1" dirty="0" smtClean="0">
@@ -4348,7 +4288,12 @@
             <p:ph type="title"/>
           </p:nvPr>
         </p:nvSpPr>
-        <p:spPr/>
+        <p:spPr>
+          <a:xfrm>
+            <a:off x="0" y="1"/>
+            <a:ext cx="5325035" cy="1470212"/>
+          </a:xfrm>
+        </p:spPr>
         <p:txBody>
           <a:bodyPr>
             <a:normAutofit/>
@@ -4375,7 +4320,7 @@
         </p:nvSpPr>
         <p:spPr>
           <a:xfrm>
-            <a:off x="416104" y="1415265"/>
+            <a:off x="416104" y="1648355"/>
             <a:ext cx="4628508" cy="5191723"/>
           </a:xfrm>
         </p:spPr>
@@ -4401,11 +4346,7 @@
             <a:pPr lvl="1"/>
             <a:r>
               <a:rPr lang="en-US" sz="2000" dirty="0" smtClean="0"/>
-              <a:t>Regular </a:t>
-            </a:r>
-            <a:r>
-              <a:rPr lang="en-US" sz="2000" dirty="0" smtClean="0"/>
-              <a:t>expressions</a:t>
+              <a:t>Regular expressions</a:t>
             </a:r>
           </a:p>
           <a:p>
@@ -4421,12 +4362,12 @@
               <a:t>Browscap.dll in early MS </a:t>
             </a:r>
             <a:r>
-              <a:rPr lang="en-US" sz="2000" dirty="0" err="1" smtClean="0"/>
-              <a:t>webservers</a:t>
-            </a:r>
-            <a:r>
               <a:rPr lang="en-US" sz="2000" dirty="0" smtClean="0"/>
-              <a:t> (since replaced).</a:t>
+              <a:t>web servers </a:t>
+            </a:r>
+            <a:r>
+              <a:rPr lang="en-US" sz="2000" dirty="0" smtClean="0"/>
+              <a:t>(since replaced).</a:t>
             </a:r>
           </a:p>
           <a:p>
@@ -4493,7 +4434,7 @@
         </p:blipFill>
         <p:spPr bwMode="auto">
           <a:xfrm>
-            <a:off x="5245934" y="1264526"/>
+            <a:off x="5326614" y="206691"/>
             <a:ext cx="3589235" cy="2435141"/>
           </a:xfrm>
           <a:prstGeom prst="rect">
@@ -4510,8 +4451,8 @@
         </p:nvSpPr>
         <p:spPr>
           <a:xfrm>
-            <a:off x="5280212" y="3836894"/>
-            <a:ext cx="3702423" cy="2862322"/>
+            <a:off x="5244354" y="2752165"/>
+            <a:ext cx="3702422" cy="3831818"/>
           </a:xfrm>
           <a:prstGeom prst="rect">
             <a:avLst/>
@@ -4544,26 +4485,51 @@
           </a:p>
           <a:p>
             <a:r>
-              <a:rPr lang="en-US" dirty="0" smtClean="0"/>
+              <a:rPr lang="en-US" sz="1500" dirty="0" smtClean="0"/>
               <a:t>Many user agents attempt to deceive the server parsing engine in order to get specific content, i.e. pages optimized for </a:t>
             </a:r>
             <a:r>
-              <a:rPr lang="en-US" smtClean="0"/>
+              <a:rPr lang="en-US" sz="1500" dirty="0" err="1" smtClean="0"/>
               <a:t>GoogleBot</a:t>
             </a:r>
             <a:r>
-              <a:rPr lang="en-US" dirty="0" smtClean="0"/>
+              <a:rPr lang="en-US" sz="1500" dirty="0" smtClean="0"/>
               <a:t>, by adding specific tokens to the UA string.  A hierarchal </a:t>
             </a:r>
             <a:r>
-              <a:rPr lang="en-US" dirty="0" err="1" smtClean="0"/>
-              <a:t>regexp</a:t>
-            </a:r>
-            <a:r>
-              <a:rPr lang="en-US" dirty="0" smtClean="0"/>
-              <a:t> engine will be confused by such additions.  A discriminative algorithm may still classify the modified string correctly.</a:t>
-            </a:r>
-            <a:endParaRPr lang="en-US" dirty="0" smtClean="0"/>
+              <a:rPr lang="en-US" sz="1500" dirty="0" err="1" smtClean="0"/>
+              <a:t>regex</a:t>
+            </a:r>
+            <a:r>
+              <a:rPr lang="en-US" sz="1500" dirty="0" smtClean="0"/>
+              <a:t> </a:t>
+            </a:r>
+            <a:r>
+              <a:rPr lang="en-US" sz="1500" dirty="0" smtClean="0"/>
+              <a:t>engine will be confused by such additions.  A discriminative algorithm may still classify the modified string correctly</a:t>
+            </a:r>
+            <a:r>
+              <a:rPr lang="en-US" sz="1500" dirty="0" smtClean="0"/>
+              <a:t>.</a:t>
+            </a:r>
+          </a:p>
+          <a:p>
+            <a:endParaRPr lang="en-US" sz="1500" dirty="0" smtClean="0"/>
+          </a:p>
+          <a:p>
+            <a:r>
+              <a:rPr lang="en-US" sz="1500" dirty="0" smtClean="0"/>
+              <a:t>UA strings are frequently mangled due to </a:t>
+            </a:r>
+            <a:r>
+              <a:rPr lang="en-US" sz="1500" dirty="0" err="1" smtClean="0"/>
+              <a:t>plugins</a:t>
+            </a:r>
+            <a:r>
+              <a:rPr lang="en-US" sz="1500" dirty="0" smtClean="0"/>
+              <a:t> and other modifications.  For example many UA strings in our dataset have an entirely different UA string inserted midstream.  These UA strings sometimes do not have properly terminated parentheses and are hard to parse for robustly.</a:t>
+            </a:r>
+            <a:endParaRPr lang="en-US" sz="1500" dirty="0" smtClean="0"/>
           </a:p>
         </p:txBody>
       </p:sp>
@@ -4594,6 +4560,513 @@
       </p:grpSpPr>
       <p:sp>
         <p:nvSpPr>
+          <p:cNvPr id="6" name="Content Placeholder 2"/>
+          <p:cNvSpPr txBox="1">
+            <a:spLocks/>
+          </p:cNvSpPr>
+          <p:nvPr/>
+        </p:nvSpPr>
+        <p:spPr>
+          <a:xfrm>
+            <a:off x="0" y="3254186"/>
+            <a:ext cx="9144000" cy="3550023"/>
+          </a:xfrm>
+          <a:prstGeom prst="rect">
+            <a:avLst/>
+          </a:prstGeom>
+        </p:spPr>
+        <p:txBody>
+          <a:bodyPr vert="horz" lIns="91440" tIns="45720" rIns="91440" bIns="45720" rtlCol="0">
+            <a:normAutofit fontScale="70000" lnSpcReduction="20000"/>
+          </a:bodyPr>
+          <a:lstStyle/>
+          <a:p>
+            <a:pPr marL="342900" marR="0" lvl="0" indent="-342900" algn="l" defTabSz="914400" rtl="0" eaLnBrk="1" fontAlgn="auto" latinLnBrk="0" hangingPunct="1">
+              <a:lnSpc>
+                <a:spcPct val="100000"/>
+              </a:lnSpc>
+              <a:spcBef>
+                <a:spcPct val="20000"/>
+              </a:spcBef>
+              <a:spcAft>
+                <a:spcPts val="0"/>
+              </a:spcAft>
+              <a:buClrTx/>
+              <a:buSzTx/>
+              <a:buFont typeface="Arial" pitchFamily="34" charset="0"/>
+              <a:buChar char="•"/>
+              <a:tabLst/>
+              <a:defRPr/>
+            </a:pPr>
+            <a:r>
+              <a:rPr kumimoji="0" lang="en-US" sz="3200" b="0" i="0" u="none" strike="noStrike" kern="1200" cap="none" spc="0" normalizeH="0" baseline="0" noProof="0" dirty="0" err="1" smtClean="0">
+                <a:ln>
+                  <a:noFill/>
+                </a:ln>
+                <a:solidFill>
+                  <a:schemeClr val="tx1"/>
+                </a:solidFill>
+                <a:effectLst/>
+                <a:uLnTx/>
+                <a:uFillTx/>
+                <a:latin typeface="+mn-lt"/>
+                <a:ea typeface="+mn-ea"/>
+                <a:cs typeface="+mn-cs"/>
+              </a:rPr>
+              <a:t>Levenshtein</a:t>
+            </a:r>
+            <a:r>
+              <a:rPr kumimoji="0" lang="en-US" sz="3200" b="0" i="0" u="none" strike="noStrike" kern="1200" cap="none" spc="0" normalizeH="0" baseline="0" noProof="0" dirty="0" smtClean="0">
+                <a:ln>
+                  <a:noFill/>
+                </a:ln>
+                <a:solidFill>
+                  <a:schemeClr val="tx1"/>
+                </a:solidFill>
+                <a:effectLst/>
+                <a:uLnTx/>
+                <a:uFillTx/>
+                <a:latin typeface="+mn-lt"/>
+                <a:ea typeface="+mn-ea"/>
+                <a:cs typeface="+mn-cs"/>
+              </a:rPr>
+              <a:t> Edit Distance Kernel</a:t>
+            </a:r>
+          </a:p>
+          <a:p>
+            <a:pPr marL="742950" marR="0" lvl="1" indent="-285750" algn="l" defTabSz="914400" rtl="0" eaLnBrk="1" fontAlgn="auto" latinLnBrk="0" hangingPunct="1">
+              <a:lnSpc>
+                <a:spcPct val="100000"/>
+              </a:lnSpc>
+              <a:spcBef>
+                <a:spcPct val="20000"/>
+              </a:spcBef>
+              <a:spcAft>
+                <a:spcPts val="0"/>
+              </a:spcAft>
+              <a:buClrTx/>
+              <a:buSzTx/>
+              <a:buFont typeface="Arial" pitchFamily="34" charset="0"/>
+              <a:buChar char="–"/>
+              <a:tabLst/>
+              <a:defRPr/>
+            </a:pPr>
+            <a:r>
+              <a:rPr kumimoji="0" lang="en-US" sz="2800" b="0" i="0" u="none" strike="noStrike" kern="1200" cap="none" spc="0" normalizeH="0" baseline="0" noProof="0" dirty="0" smtClean="0">
+                <a:ln>
+                  <a:noFill/>
+                </a:ln>
+                <a:solidFill>
+                  <a:schemeClr val="tx1"/>
+                </a:solidFill>
+                <a:effectLst/>
+                <a:uLnTx/>
+                <a:uFillTx/>
+                <a:latin typeface="+mn-lt"/>
+                <a:ea typeface="+mn-ea"/>
+                <a:cs typeface="+mn-cs"/>
+              </a:rPr>
+              <a:t>Edit distance is defined as minimum number of single character edits to change one string into another.</a:t>
+            </a:r>
+          </a:p>
+          <a:p>
+            <a:pPr marL="742950" marR="0" lvl="1" indent="-285750" algn="l" defTabSz="914400" rtl="0" eaLnBrk="1" fontAlgn="auto" latinLnBrk="0" hangingPunct="1">
+              <a:lnSpc>
+                <a:spcPct val="100000"/>
+              </a:lnSpc>
+              <a:spcBef>
+                <a:spcPct val="20000"/>
+              </a:spcBef>
+              <a:spcAft>
+                <a:spcPts val="0"/>
+              </a:spcAft>
+              <a:buClrTx/>
+              <a:buSzTx/>
+              <a:buFont typeface="Arial" pitchFamily="34" charset="0"/>
+              <a:buChar char="–"/>
+              <a:tabLst/>
+              <a:defRPr/>
+            </a:pPr>
+            <a:r>
+              <a:rPr kumimoji="0" lang="en-US" sz="2800" b="0" i="0" u="none" strike="noStrike" kern="1200" cap="none" spc="0" normalizeH="0" baseline="0" noProof="0" dirty="0" smtClean="0">
+                <a:ln>
+                  <a:noFill/>
+                </a:ln>
+                <a:solidFill>
+                  <a:schemeClr val="tx1"/>
+                </a:solidFill>
+                <a:effectLst/>
+                <a:uLnTx/>
+                <a:uFillTx/>
+                <a:latin typeface="+mn-lt"/>
+                <a:ea typeface="+mn-ea"/>
+                <a:cs typeface="+mn-cs"/>
+              </a:rPr>
+              <a:t>Edit distance kernel: </a:t>
+            </a:r>
+          </a:p>
+          <a:p>
+            <a:pPr marL="742950" marR="0" lvl="1" indent="-285750" algn="l" defTabSz="914400" rtl="0" eaLnBrk="1" fontAlgn="auto" latinLnBrk="0" hangingPunct="1">
+              <a:lnSpc>
+                <a:spcPct val="100000"/>
+              </a:lnSpc>
+              <a:spcBef>
+                <a:spcPct val="20000"/>
+              </a:spcBef>
+              <a:spcAft>
+                <a:spcPts val="0"/>
+              </a:spcAft>
+              <a:buClrTx/>
+              <a:buSzTx/>
+              <a:buFont typeface="Arial" pitchFamily="34" charset="0"/>
+              <a:buChar char="–"/>
+              <a:tabLst/>
+              <a:defRPr/>
+            </a:pPr>
+            <a:r>
+              <a:rPr kumimoji="0" lang="en-US" sz="2800" b="0" i="0" u="none" strike="noStrike" kern="1200" cap="none" spc="0" normalizeH="0" baseline="0" noProof="0" dirty="0" smtClean="0">
+                <a:ln>
+                  <a:noFill/>
+                </a:ln>
+                <a:solidFill>
+                  <a:schemeClr val="tx1"/>
+                </a:solidFill>
+                <a:effectLst/>
+                <a:uLnTx/>
+                <a:uFillTx/>
+                <a:latin typeface="+mn-lt"/>
+                <a:ea typeface="+mn-ea"/>
+                <a:cs typeface="+mn-cs"/>
+              </a:rPr>
+              <a:t>This kernel scales as </a:t>
+            </a:r>
+            <a:r>
+              <a:rPr kumimoji="0" lang="en-US" sz="2600" b="0" i="0" u="none" strike="noStrike" kern="1200" cap="none" spc="0" normalizeH="0" baseline="0" noProof="0" dirty="0" smtClean="0">
+                <a:ln>
+                  <a:noFill/>
+                </a:ln>
+                <a:solidFill>
+                  <a:schemeClr val="tx1"/>
+                </a:solidFill>
+                <a:effectLst/>
+                <a:uLnTx/>
+                <a:uFillTx/>
+                <a:latin typeface="Adobe Garamond Pro" pitchFamily="18" charset="0"/>
+              </a:rPr>
+              <a:t>(</a:t>
+            </a:r>
+            <a:r>
+              <a:rPr kumimoji="0" lang="en-US" sz="2600" b="0" i="1" u="none" strike="noStrike" kern="1200" cap="none" spc="0" normalizeH="0" baseline="0" noProof="0" dirty="0" smtClean="0">
+                <a:ln>
+                  <a:noFill/>
+                </a:ln>
+                <a:solidFill>
+                  <a:schemeClr val="tx1"/>
+                </a:solidFill>
+                <a:effectLst/>
+                <a:uLnTx/>
+                <a:uFillTx/>
+                <a:latin typeface="Adobe Garamond Pro" pitchFamily="18" charset="0"/>
+              </a:rPr>
+              <a:t>string length</a:t>
+            </a:r>
+            <a:r>
+              <a:rPr kumimoji="0" lang="en-US" sz="2600" b="0" i="0" u="none" strike="noStrike" kern="1200" cap="none" spc="0" normalizeH="0" baseline="0" noProof="0" dirty="0" smtClean="0">
+                <a:ln>
+                  <a:noFill/>
+                </a:ln>
+                <a:solidFill>
+                  <a:schemeClr val="tx1"/>
+                </a:solidFill>
+                <a:effectLst/>
+                <a:uLnTx/>
+                <a:uFillTx/>
+                <a:latin typeface="Adobe Garamond Pro" pitchFamily="18" charset="0"/>
+              </a:rPr>
+              <a:t>)</a:t>
+            </a:r>
+            <a:r>
+              <a:rPr kumimoji="0" lang="en-US" sz="2600" b="0" i="0" u="none" strike="noStrike" kern="1200" cap="none" spc="0" normalizeH="0" baseline="30000" noProof="0" dirty="0" smtClean="0">
+                <a:ln>
+                  <a:noFill/>
+                </a:ln>
+                <a:solidFill>
+                  <a:schemeClr val="tx1"/>
+                </a:solidFill>
+                <a:effectLst/>
+                <a:uLnTx/>
+                <a:uFillTx/>
+                <a:latin typeface="Adobe Garamond Pro" pitchFamily="18" charset="0"/>
+              </a:rPr>
+              <a:t>2</a:t>
+            </a:r>
+            <a:r>
+              <a:rPr kumimoji="0" lang="en-US" sz="2800" b="0" i="0" u="none" strike="noStrike" kern="1200" cap="none" spc="0" normalizeH="0" baseline="0" noProof="0" dirty="0" smtClean="0">
+                <a:ln>
+                  <a:noFill/>
+                </a:ln>
+                <a:solidFill>
+                  <a:schemeClr val="tx1"/>
+                </a:solidFill>
+                <a:effectLst/>
+                <a:uLnTx/>
+                <a:uFillTx/>
+                <a:latin typeface="+mn-lt"/>
+                <a:ea typeface="+mn-ea"/>
+                <a:cs typeface="+mn-cs"/>
+              </a:rPr>
+              <a:t>, therefore we implement a tokenized version where the string is instead a list of tokens (see above).</a:t>
+            </a:r>
+          </a:p>
+          <a:p>
+            <a:pPr marL="342900" marR="0" lvl="0" indent="-342900" algn="l" defTabSz="914400" rtl="0" eaLnBrk="1" fontAlgn="auto" latinLnBrk="0" hangingPunct="1">
+              <a:lnSpc>
+                <a:spcPct val="100000"/>
+              </a:lnSpc>
+              <a:spcBef>
+                <a:spcPct val="20000"/>
+              </a:spcBef>
+              <a:spcAft>
+                <a:spcPts val="0"/>
+              </a:spcAft>
+              <a:buClrTx/>
+              <a:buSzTx/>
+              <a:buFont typeface="Arial" pitchFamily="34" charset="0"/>
+              <a:buChar char="•"/>
+              <a:tabLst/>
+              <a:defRPr/>
+            </a:pPr>
+            <a:r>
+              <a:rPr kumimoji="0" lang="en-US" sz="3200" b="0" i="0" u="none" strike="noStrike" kern="1200" cap="none" spc="0" normalizeH="0" baseline="0" noProof="0" dirty="0" smtClean="0">
+                <a:ln>
+                  <a:noFill/>
+                </a:ln>
+                <a:solidFill>
+                  <a:schemeClr val="tx1"/>
+                </a:solidFill>
+                <a:effectLst/>
+                <a:uLnTx/>
+                <a:uFillTx/>
+                <a:latin typeface="+mn-lt"/>
+                <a:ea typeface="+mn-ea"/>
+                <a:cs typeface="+mn-cs"/>
+              </a:rPr>
+              <a:t>Subsequence Kernel: </a:t>
+            </a:r>
+          </a:p>
+          <a:p>
+            <a:pPr marL="742950" marR="0" lvl="1" indent="-285750" algn="l" defTabSz="914400" rtl="0" eaLnBrk="1" fontAlgn="auto" latinLnBrk="0" hangingPunct="1">
+              <a:lnSpc>
+                <a:spcPct val="100000"/>
+              </a:lnSpc>
+              <a:spcBef>
+                <a:spcPct val="20000"/>
+              </a:spcBef>
+              <a:spcAft>
+                <a:spcPts val="0"/>
+              </a:spcAft>
+              <a:buClrTx/>
+              <a:buSzTx/>
+              <a:buFont typeface="Arial" pitchFamily="34" charset="0"/>
+              <a:buChar char="–"/>
+              <a:tabLst/>
+              <a:defRPr/>
+            </a:pPr>
+            <a:r>
+              <a:rPr kumimoji="0" lang="en-US" sz="2800" b="0" i="0" u="none" strike="noStrike" kern="1200" cap="none" spc="0" normalizeH="0" baseline="0" noProof="0" dirty="0" smtClean="0">
+                <a:ln>
+                  <a:noFill/>
+                </a:ln>
+                <a:solidFill>
+                  <a:schemeClr val="tx1"/>
+                </a:solidFill>
+                <a:effectLst/>
+                <a:uLnTx/>
+                <a:uFillTx/>
+                <a:latin typeface="+mn-lt"/>
+                <a:ea typeface="+mn-ea"/>
+                <a:cs typeface="+mn-cs"/>
+              </a:rPr>
+              <a:t>This kernel compares all shared subsequences of two strings.  Subsequences do not have to be contiguous.  The longer each string is, the lower its weight in the Kernel.  </a:t>
+            </a:r>
+            <a:r>
+              <a:rPr kumimoji="0" lang="en-US" sz="2000" b="0" i="0" u="none" strike="noStrike" kern="1200" cap="none" spc="0" normalizeH="0" baseline="0" noProof="0" dirty="0" smtClean="0">
+                <a:ln>
+                  <a:noFill/>
+                </a:ln>
+                <a:solidFill>
+                  <a:schemeClr val="tx1"/>
+                </a:solidFill>
+                <a:effectLst/>
+                <a:uLnTx/>
+                <a:uFillTx/>
+                <a:latin typeface="+mn-lt"/>
+                <a:ea typeface="+mn-ea"/>
+                <a:cs typeface="+mn-cs"/>
+              </a:rPr>
+              <a:t>{See: </a:t>
+            </a:r>
+            <a:r>
+              <a:rPr kumimoji="0" lang="en-US" sz="2000" b="0" i="0" u="none" strike="noStrike" kern="1200" cap="none" spc="0" normalizeH="0" baseline="0" noProof="0" dirty="0" err="1" smtClean="0">
+                <a:ln>
+                  <a:noFill/>
+                </a:ln>
+                <a:solidFill>
+                  <a:schemeClr val="tx1"/>
+                </a:solidFill>
+                <a:effectLst/>
+                <a:uLnTx/>
+                <a:uFillTx/>
+                <a:latin typeface="+mn-lt"/>
+                <a:ea typeface="+mn-ea"/>
+                <a:cs typeface="+mn-cs"/>
+              </a:rPr>
+              <a:t>Lodhi</a:t>
+            </a:r>
+            <a:r>
+              <a:rPr kumimoji="0" lang="en-US" sz="2000" b="0" i="0" u="none" strike="noStrike" kern="1200" cap="none" spc="0" normalizeH="0" baseline="0" noProof="0" dirty="0" smtClean="0">
+                <a:ln>
+                  <a:noFill/>
+                </a:ln>
+                <a:solidFill>
+                  <a:schemeClr val="tx1"/>
+                </a:solidFill>
+                <a:effectLst/>
+                <a:uLnTx/>
+                <a:uFillTx/>
+                <a:latin typeface="+mn-lt"/>
+                <a:ea typeface="+mn-ea"/>
+                <a:cs typeface="+mn-cs"/>
+              </a:rPr>
+              <a:t> et al., Journal of ML Research,</a:t>
+            </a:r>
+            <a:r>
+              <a:rPr kumimoji="0" lang="en-US" sz="2000" b="0" i="0" u="none" strike="noStrike" kern="1200" cap="none" spc="0" normalizeH="0" noProof="0" dirty="0" smtClean="0">
+                <a:ln>
+                  <a:noFill/>
+                </a:ln>
+                <a:solidFill>
+                  <a:schemeClr val="tx1"/>
+                </a:solidFill>
+                <a:effectLst/>
+                <a:uLnTx/>
+                <a:uFillTx/>
+                <a:latin typeface="+mn-lt"/>
+                <a:ea typeface="+mn-ea"/>
+                <a:cs typeface="+mn-cs"/>
+              </a:rPr>
+              <a:t> </a:t>
+            </a:r>
+            <a:r>
+              <a:rPr kumimoji="0" lang="en-US" sz="2000" i="0" u="none" strike="noStrike" kern="1200" cap="none" spc="0" normalizeH="0" baseline="0" noProof="0" dirty="0" smtClean="0">
+                <a:ln>
+                  <a:noFill/>
+                </a:ln>
+                <a:solidFill>
+                  <a:schemeClr val="tx1"/>
+                </a:solidFill>
+                <a:effectLst/>
+                <a:uLnTx/>
+                <a:uFillTx/>
+                <a:latin typeface="+mn-lt"/>
+                <a:ea typeface="+mn-ea"/>
+                <a:cs typeface="+mn-cs"/>
+              </a:rPr>
+              <a:t>Vol. 2, 2002</a:t>
+            </a:r>
+            <a:r>
+              <a:rPr kumimoji="0" lang="en-US" sz="2000" b="0" i="0" u="none" strike="noStrike" kern="1200" cap="none" spc="0" normalizeH="0" baseline="0" noProof="0" dirty="0" smtClean="0">
+                <a:ln>
+                  <a:noFill/>
+                </a:ln>
+                <a:solidFill>
+                  <a:schemeClr val="tx1"/>
+                </a:solidFill>
+                <a:effectLst/>
+                <a:uLnTx/>
+                <a:uFillTx/>
+                <a:latin typeface="+mn-lt"/>
+                <a:ea typeface="+mn-ea"/>
+                <a:cs typeface="+mn-cs"/>
+              </a:rPr>
+              <a:t>, 419-444</a:t>
+            </a:r>
+            <a:r>
+              <a:rPr kumimoji="0" lang="en-US" sz="2000" b="0" i="0" u="none" strike="noStrike" kern="1200" cap="none" spc="0" normalizeH="0" noProof="0" dirty="0" smtClean="0">
+                <a:ln>
+                  <a:noFill/>
+                </a:ln>
+                <a:solidFill>
+                  <a:schemeClr val="tx1"/>
+                </a:solidFill>
+                <a:effectLst/>
+                <a:uLnTx/>
+                <a:uFillTx/>
+                <a:latin typeface="+mn-lt"/>
+                <a:ea typeface="+mn-ea"/>
+                <a:cs typeface="+mn-cs"/>
+              </a:rPr>
+              <a:t> for more details.</a:t>
+            </a:r>
+            <a:r>
+              <a:rPr kumimoji="0" lang="en-US" sz="2000" b="0" i="0" u="none" strike="noStrike" kern="1200" cap="none" spc="0" normalizeH="0" baseline="0" noProof="0" dirty="0" smtClean="0">
+                <a:ln>
+                  <a:noFill/>
+                </a:ln>
+                <a:solidFill>
+                  <a:schemeClr val="tx1"/>
+                </a:solidFill>
+                <a:effectLst/>
+                <a:uLnTx/>
+                <a:uFillTx/>
+                <a:latin typeface="+mn-lt"/>
+                <a:ea typeface="+mn-ea"/>
+                <a:cs typeface="+mn-cs"/>
+              </a:rPr>
+              <a:t> }</a:t>
+            </a:r>
+          </a:p>
+          <a:p>
+            <a:pPr marL="742950" marR="0" lvl="1" indent="-285750" algn="l" defTabSz="914400" rtl="0" eaLnBrk="1" fontAlgn="auto" latinLnBrk="0" hangingPunct="1">
+              <a:lnSpc>
+                <a:spcPct val="100000"/>
+              </a:lnSpc>
+              <a:spcBef>
+                <a:spcPct val="20000"/>
+              </a:spcBef>
+              <a:spcAft>
+                <a:spcPts val="0"/>
+              </a:spcAft>
+              <a:buClrTx/>
+              <a:buSzTx/>
+              <a:buFont typeface="Arial" pitchFamily="34" charset="0"/>
+              <a:buChar char="–"/>
+              <a:tabLst/>
+              <a:defRPr/>
+            </a:pPr>
+            <a:r>
+              <a:rPr lang="en-US" sz="2800" dirty="0" smtClean="0"/>
+              <a:t>This Kernel was also tokenized.  Our goal was to include order and position information in the Kernel, which could be important in UA string classification.</a:t>
+            </a:r>
+            <a:endParaRPr kumimoji="0" lang="en-US" sz="2800" b="0" i="0" u="none" strike="noStrike" kern="1200" cap="none" spc="0" normalizeH="0" baseline="0" noProof="0" dirty="0" smtClean="0">
+              <a:ln>
+                <a:noFill/>
+              </a:ln>
+              <a:solidFill>
+                <a:schemeClr val="tx1"/>
+              </a:solidFill>
+              <a:effectLst/>
+              <a:uLnTx/>
+              <a:uFillTx/>
+              <a:latin typeface="+mn-lt"/>
+              <a:ea typeface="+mn-ea"/>
+              <a:cs typeface="+mn-cs"/>
+            </a:endParaRPr>
+          </a:p>
+        </p:txBody>
+      </p:sp>
+      <p:sp>
+        <p:nvSpPr>
           <p:cNvPr id="2" name="Title 1"/>
           <p:cNvSpPr>
             <a:spLocks noGrp="1"/>
@@ -4602,16 +5075,23 @@
             <p:ph type="title"/>
           </p:nvPr>
         </p:nvSpPr>
-        <p:spPr/>
-        <p:txBody>
-          <a:bodyPr/>
-          <a:lstStyle/>
-          <a:p>
-            <a:r>
-              <a:rPr lang="en-US" dirty="0" smtClean="0"/>
+        <p:spPr>
+          <a:xfrm>
+            <a:off x="0" y="0"/>
+            <a:ext cx="6472518" cy="702515"/>
+          </a:xfrm>
+        </p:spPr>
+        <p:txBody>
+          <a:bodyPr>
+            <a:normAutofit/>
+          </a:bodyPr>
+          <a:lstStyle/>
+          <a:p>
+            <a:r>
+              <a:rPr lang="en-US" sz="4000" dirty="0" smtClean="0"/>
               <a:t>SVM Based Text Classification</a:t>
             </a:r>
-            <a:endParaRPr lang="en-US" dirty="0"/>
+            <a:endParaRPr lang="en-US" sz="4000" dirty="0"/>
           </a:p>
         </p:txBody>
       </p:sp>
@@ -4625,39 +5105,322 @@
             <p:ph idx="1"/>
           </p:nvPr>
         </p:nvSpPr>
-        <p:spPr/>
-        <p:txBody>
-          <a:bodyPr/>
+        <p:spPr>
+          <a:xfrm>
+            <a:off x="0" y="672353"/>
+            <a:ext cx="9144000" cy="1885109"/>
+          </a:xfrm>
+        </p:spPr>
+        <p:txBody>
+          <a:bodyPr>
+            <a:normAutofit fontScale="62500" lnSpcReduction="20000"/>
+          </a:bodyPr>
           <a:lstStyle/>
           <a:p>
             <a:r>
               <a:rPr lang="en-US" dirty="0" smtClean="0"/>
-              <a:t>Dictionary/Feature Vector with Linear/Poly/RBF Kernels</a:t>
+              <a:t>SVMs can be used as robust text classifiers due to </a:t>
+            </a:r>
+            <a:r>
+              <a:rPr lang="en-US" dirty="0" err="1" smtClean="0"/>
+              <a:t>overfitting</a:t>
+            </a:r>
+            <a:r>
+              <a:rPr lang="en-US" dirty="0" smtClean="0"/>
+              <a:t> protection property of maximal margin classifier.</a:t>
+            </a:r>
+            <a:endParaRPr lang="en-US" dirty="0" smtClean="0"/>
+          </a:p>
+          <a:p>
+            <a:r>
+              <a:rPr lang="en-US" dirty="0" smtClean="0"/>
+              <a:t>Dictionary/Feature </a:t>
+            </a:r>
+            <a:r>
+              <a:rPr lang="en-US" dirty="0" smtClean="0"/>
+              <a:t>Vector with Linear/Poly/RBF Kernels</a:t>
             </a:r>
           </a:p>
           <a:p>
             <a:pPr lvl="1"/>
             <a:r>
               <a:rPr lang="en-US" dirty="0" smtClean="0"/>
-              <a:t>Tokenization</a:t>
-            </a:r>
-          </a:p>
-          <a:p>
-            <a:r>
-              <a:rPr lang="en-US" dirty="0" err="1" smtClean="0"/>
-              <a:t>Levenshtein</a:t>
+              <a:t>Tokenization of UA strings (for our data set) creates 10</a:t>
+            </a:r>
+            <a:r>
+              <a:rPr lang="en-US" baseline="30000" dirty="0" smtClean="0"/>
+              <a:t>4 </a:t>
             </a:r>
             <a:r>
               <a:rPr lang="en-US" dirty="0" smtClean="0"/>
-              <a:t> Edit Distance Kernel</a:t>
-            </a:r>
-          </a:p>
-          <a:p>
+              <a:t>features.  Tokens are generated by breaking the string apart at any of following characters: </a:t>
+            </a:r>
+            <a:r>
+              <a:rPr lang="en-US" b="1" dirty="0" smtClean="0"/>
+              <a:t>[],./\() </a:t>
+            </a:r>
             <a:r>
               <a:rPr lang="en-US" dirty="0" smtClean="0"/>
-              <a:t>Subsequence Kernel</a:t>
+              <a:t>or whitespace.  This method is robust, and does not depend on parsing for paired parentheses.  For numbers, all numbers of length </a:t>
+            </a:r>
+            <a:r>
+              <a:rPr lang="en-US" i="1" dirty="0" smtClean="0"/>
+              <a:t>d</a:t>
+            </a:r>
+            <a:r>
+              <a:rPr lang="en-US" dirty="0" smtClean="0"/>
+              <a:t> are coalesced into a single token.</a:t>
+            </a:r>
+          </a:p>
+        </p:txBody>
+      </p:sp>
+      <p:graphicFrame>
+        <p:nvGraphicFramePr>
+          <p:cNvPr id="4" name="Object 3"/>
+          <p:cNvGraphicFramePr>
+            <a:graphicFrameLocks noChangeAspect="1"/>
+          </p:cNvGraphicFramePr>
+          <p:nvPr/>
+        </p:nvGraphicFramePr>
+        <p:xfrm>
+          <a:off x="2954431" y="4093974"/>
+          <a:ext cx="2980204" cy="420668"/>
+        </p:xfrm>
+        <a:graphic>
+          <a:graphicData uri="http://schemas.openxmlformats.org/presentationml/2006/ole">
+            <p:oleObj spid="_x0000_s1026" name="Equation" r:id="rId3" imgW="1981080" imgH="279360" progId="Equation.DSMT4">
+              <p:embed/>
+            </p:oleObj>
+          </a:graphicData>
+        </a:graphic>
+      </p:graphicFrame>
+      <p:sp>
+        <p:nvSpPr>
+          <p:cNvPr id="7" name="TextBox 6"/>
+          <p:cNvSpPr txBox="1"/>
+          <p:nvPr/>
+        </p:nvSpPr>
+        <p:spPr>
+          <a:xfrm>
+            <a:off x="152400" y="2529175"/>
+            <a:ext cx="1667435" cy="646331"/>
+          </a:xfrm>
+          <a:prstGeom prst="rect">
+            <a:avLst/>
+          </a:prstGeom>
+          <a:noFill/>
+        </p:spPr>
+        <p:txBody>
+          <a:bodyPr wrap="square" rtlCol="0">
+            <a:spAutoFit/>
+          </a:bodyPr>
+          <a:lstStyle/>
+          <a:p>
+            <a:r>
+              <a:rPr lang="en-US" dirty="0" smtClean="0"/>
+              <a:t>Tokenization Example:</a:t>
             </a:r>
             <a:endParaRPr lang="en-US" dirty="0"/>
+          </a:p>
+        </p:txBody>
+      </p:sp>
+      <p:sp>
+        <p:nvSpPr>
+          <p:cNvPr id="8" name="TextBox 7"/>
+          <p:cNvSpPr txBox="1"/>
+          <p:nvPr/>
+        </p:nvSpPr>
+        <p:spPr>
+          <a:xfrm>
+            <a:off x="1868300" y="2573997"/>
+            <a:ext cx="6051177" cy="646331"/>
+          </a:xfrm>
+          <a:prstGeom prst="rect">
+            <a:avLst/>
+          </a:prstGeom>
+          <a:noFill/>
+        </p:spPr>
+        <p:txBody>
+          <a:bodyPr wrap="square" rtlCol="0">
+            <a:spAutoFit/>
+          </a:bodyPr>
+          <a:lstStyle/>
+          <a:p>
+            <a:r>
+              <a:rPr lang="en-US" dirty="0" smtClean="0">
+                <a:solidFill>
+                  <a:srgbClr val="FF0000"/>
+                </a:solidFill>
+              </a:rPr>
+              <a:t>AmigaVoyager</a:t>
+            </a:r>
+            <a:r>
+              <a:rPr lang="en-US" dirty="0" smtClean="0"/>
+              <a:t>/</a:t>
+            </a:r>
+            <a:r>
+              <a:rPr lang="en-US" dirty="0" smtClean="0">
+                <a:solidFill>
+                  <a:schemeClr val="tx2">
+                    <a:lumMod val="60000"/>
+                    <a:lumOff val="40000"/>
+                  </a:schemeClr>
+                </a:solidFill>
+              </a:rPr>
+              <a:t>2</a:t>
+            </a:r>
+            <a:r>
+              <a:rPr lang="en-US" dirty="0" smtClean="0"/>
+              <a:t>.</a:t>
+            </a:r>
+            <a:r>
+              <a:rPr lang="en-US" dirty="0" smtClean="0">
+                <a:solidFill>
+                  <a:schemeClr val="accent6">
+                    <a:lumMod val="75000"/>
+                  </a:schemeClr>
+                </a:solidFill>
+              </a:rPr>
+              <a:t>95</a:t>
+            </a:r>
+            <a:r>
+              <a:rPr lang="en-US" dirty="0" smtClean="0"/>
+              <a:t> (</a:t>
+            </a:r>
+            <a:r>
+              <a:rPr lang="en-US" dirty="0" smtClean="0">
+                <a:solidFill>
+                  <a:srgbClr val="00B050"/>
+                </a:solidFill>
+              </a:rPr>
+              <a:t>compatible</a:t>
+            </a:r>
+            <a:r>
+              <a:rPr lang="en-US" dirty="0" smtClean="0"/>
+              <a:t>; </a:t>
+            </a:r>
+            <a:r>
+              <a:rPr lang="en-US" dirty="0" smtClean="0">
+                <a:solidFill>
+                  <a:schemeClr val="accent4">
+                    <a:lumMod val="75000"/>
+                  </a:schemeClr>
+                </a:solidFill>
+              </a:rPr>
+              <a:t>MC680x0</a:t>
+            </a:r>
+            <a:r>
+              <a:rPr lang="en-US" dirty="0" smtClean="0"/>
+              <a:t>; </a:t>
+            </a:r>
+            <a:r>
+              <a:rPr lang="en-US" dirty="0" err="1" smtClean="0">
+                <a:solidFill>
+                  <a:schemeClr val="bg2">
+                    <a:lumMod val="50000"/>
+                  </a:schemeClr>
+                </a:solidFill>
+              </a:rPr>
+              <a:t>AmigaOS</a:t>
+            </a:r>
+            <a:r>
+              <a:rPr lang="en-US" dirty="0" smtClean="0"/>
+              <a:t>)</a:t>
+            </a:r>
+          </a:p>
+          <a:p>
+            <a:r>
+              <a:rPr lang="en-US" dirty="0" smtClean="0"/>
+              <a:t> </a:t>
+            </a:r>
+            <a:r>
+              <a:rPr lang="en-US" dirty="0" smtClean="0"/>
+              <a:t>        </a:t>
+            </a:r>
+            <a:r>
+              <a:rPr lang="en-US" dirty="0" smtClean="0">
+                <a:solidFill>
+                  <a:srgbClr val="FF0000"/>
+                </a:solidFill>
+              </a:rPr>
+              <a:t>2353</a:t>
+            </a:r>
+            <a:r>
+              <a:rPr lang="en-US" dirty="0" smtClean="0"/>
+              <a:t>         </a:t>
+            </a:r>
+            <a:r>
+              <a:rPr lang="en-US" dirty="0" smtClean="0">
+                <a:solidFill>
+                  <a:schemeClr val="tx2">
+                    <a:lumMod val="60000"/>
+                    <a:lumOff val="40000"/>
+                  </a:schemeClr>
+                </a:solidFill>
+              </a:rPr>
+              <a:t>0</a:t>
+            </a:r>
+            <a:r>
+              <a:rPr lang="en-US" dirty="0" smtClean="0"/>
+              <a:t>  </a:t>
+            </a:r>
+            <a:r>
+              <a:rPr lang="en-US" dirty="0" smtClean="0">
+                <a:solidFill>
+                  <a:schemeClr val="accent6">
+                    <a:lumMod val="75000"/>
+                  </a:schemeClr>
+                </a:solidFill>
+              </a:rPr>
+              <a:t>10</a:t>
+            </a:r>
+            <a:r>
+              <a:rPr lang="en-US" dirty="0" smtClean="0"/>
+              <a:t>         </a:t>
+            </a:r>
+            <a:r>
+              <a:rPr lang="en-US" dirty="0" smtClean="0">
+                <a:solidFill>
+                  <a:srgbClr val="00B050"/>
+                </a:solidFill>
+              </a:rPr>
+              <a:t>8</a:t>
+            </a:r>
+            <a:r>
+              <a:rPr lang="en-US" dirty="0" smtClean="0"/>
+              <a:t>               </a:t>
+            </a:r>
+            <a:r>
+              <a:rPr lang="en-US" dirty="0" smtClean="0">
+                <a:solidFill>
+                  <a:schemeClr val="accent4">
+                    <a:lumMod val="75000"/>
+                  </a:schemeClr>
+                </a:solidFill>
+              </a:rPr>
+              <a:t>3348</a:t>
+            </a:r>
+            <a:r>
+              <a:rPr lang="en-US" dirty="0" smtClean="0"/>
+              <a:t>            </a:t>
+            </a:r>
+            <a:r>
+              <a:rPr lang="en-US" dirty="0" smtClean="0">
+                <a:solidFill>
+                  <a:schemeClr val="bg2">
+                    <a:lumMod val="50000"/>
+                  </a:schemeClr>
+                </a:solidFill>
+              </a:rPr>
+              <a:t>1045</a:t>
+            </a:r>
+            <a:endParaRPr lang="en-US" dirty="0">
+              <a:solidFill>
+                <a:schemeClr val="bg2">
+                  <a:lumMod val="50000"/>
+                </a:schemeClr>
+              </a:solidFill>
+            </a:endParaRPr>
           </a:p>
         </p:txBody>
       </p:sp>
@@ -4698,12 +5461,14 @@
         </p:nvSpPr>
         <p:spPr>
           <a:xfrm>
-            <a:off x="457200" y="79432"/>
-            <a:ext cx="8229600" cy="1143000"/>
-          </a:xfrm>
-        </p:spPr>
-        <p:txBody>
-          <a:bodyPr/>
+            <a:off x="0" y="0"/>
+            <a:ext cx="6373906" cy="995082"/>
+          </a:xfrm>
+        </p:spPr>
+        <p:txBody>
+          <a:bodyPr>
+            <a:normAutofit/>
+          </a:bodyPr>
           <a:lstStyle/>
           <a:p>
             <a:r>
@@ -4752,7 +5517,7 @@
         </p:nvSpPr>
         <p:spPr>
           <a:xfrm>
-            <a:off x="369877" y="1643866"/>
+            <a:off x="136787" y="1643866"/>
             <a:ext cx="534255" cy="369332"/>
           </a:xfrm>
           <a:prstGeom prst="rect">
@@ -4785,8 +5550,8 @@
         </p:nvCxnSpPr>
         <p:spPr>
           <a:xfrm flipV="1">
-            <a:off x="904132" y="1828531"/>
-            <a:ext cx="1243171" cy="1"/>
+            <a:off x="671042" y="1828531"/>
+            <a:ext cx="1476261" cy="1"/>
           </a:xfrm>
           <a:prstGeom prst="line">
             <a:avLst/>
@@ -4923,7 +5688,7 @@
         </p:nvSpPr>
         <p:spPr>
           <a:xfrm>
-            <a:off x="1274003" y="1160984"/>
+            <a:off x="1058843" y="1160984"/>
             <a:ext cx="914400" cy="369332"/>
           </a:xfrm>
           <a:prstGeom prst="rect">
@@ -4953,7 +5718,7 @@
         </p:nvCxnSpPr>
         <p:spPr>
           <a:xfrm rot="5400000">
-            <a:off x="1433250" y="1679826"/>
+            <a:off x="1236020" y="1679826"/>
             <a:ext cx="297952" cy="0"/>
           </a:xfrm>
           <a:prstGeom prst="line">
@@ -5245,50 +6010,6 @@
       </p:cxnSp>
       <p:sp>
         <p:nvSpPr>
-          <p:cNvPr id="63" name="TextBox 62"/>
-          <p:cNvSpPr txBox="1"/>
-          <p:nvPr/>
-        </p:nvSpPr>
-        <p:spPr>
-          <a:xfrm>
-            <a:off x="1243171" y="1674692"/>
-            <a:ext cx="647274" cy="369332"/>
-          </a:xfrm>
-          <a:prstGeom prst="rect">
-            <a:avLst/>
-          </a:prstGeom>
-        </p:spPr>
-        <p:style>
-          <a:lnRef idx="3">
-            <a:schemeClr val="lt1"/>
-          </a:lnRef>
-          <a:fillRef idx="1">
-            <a:schemeClr val="accent1"/>
-          </a:fillRef>
-          <a:effectRef idx="1">
-            <a:schemeClr val="accent1"/>
-          </a:effectRef>
-          <a:fontRef idx="minor">
-            <a:schemeClr val="lt1"/>
-          </a:fontRef>
-        </p:style>
-        <p:txBody>
-          <a:bodyPr wrap="square" rtlCol="0">
-            <a:spAutoFit/>
-          </a:bodyPr>
-          <a:lstStyle/>
-          <a:p>
-            <a:pPr algn="ctr"/>
-            <a:r>
-              <a:rPr lang="en-US" dirty="0" smtClean="0"/>
-              <a:t>SVM</a:t>
-            </a:r>
-            <a:endParaRPr lang="en-US" dirty="0"/>
-          </a:p>
-        </p:txBody>
-      </p:sp>
-      <p:sp>
-        <p:nvSpPr>
           <p:cNvPr id="64" name="TextBox 63"/>
           <p:cNvSpPr txBox="1"/>
           <p:nvPr/>
@@ -5712,6 +6433,114 @@
               <a:t>…</a:t>
             </a:r>
             <a:endParaRPr lang="en-US" sz="2800" dirty="0"/>
+          </a:p>
+        </p:txBody>
+      </p:sp>
+      <p:cxnSp>
+        <p:nvCxnSpPr>
+          <p:cNvPr id="37" name="Straight Connector 36"/>
+          <p:cNvCxnSpPr/>
+          <p:nvPr/>
+        </p:nvCxnSpPr>
+        <p:spPr>
+          <a:xfrm rot="5400000">
+            <a:off x="1026464" y="2164976"/>
+            <a:ext cx="690283" cy="1"/>
+          </a:xfrm>
+          <a:prstGeom prst="line">
+            <a:avLst/>
+          </a:prstGeom>
+          <a:ln w="19050">
+            <a:headEnd type="none"/>
+            <a:tailEnd type="oval"/>
+          </a:ln>
+        </p:spPr>
+        <p:style>
+          <a:lnRef idx="1">
+            <a:schemeClr val="accent1"/>
+          </a:lnRef>
+          <a:fillRef idx="0">
+            <a:schemeClr val="accent1"/>
+          </a:fillRef>
+          <a:effectRef idx="0">
+            <a:schemeClr val="accent1"/>
+          </a:effectRef>
+          <a:fontRef idx="minor">
+            <a:schemeClr val="tx1"/>
+          </a:fontRef>
+        </p:style>
+      </p:cxnSp>
+      <p:sp>
+        <p:nvSpPr>
+          <p:cNvPr id="36" name="TextBox 35"/>
+          <p:cNvSpPr txBox="1"/>
+          <p:nvPr/>
+        </p:nvSpPr>
+        <p:spPr>
+          <a:xfrm>
+            <a:off x="828070" y="1608820"/>
+            <a:ext cx="1152421" cy="646331"/>
+          </a:xfrm>
+          <a:prstGeom prst="rect">
+            <a:avLst/>
+          </a:prstGeom>
+        </p:spPr>
+        <p:style>
+          <a:lnRef idx="3">
+            <a:schemeClr val="lt1"/>
+          </a:lnRef>
+          <a:fillRef idx="1">
+            <a:schemeClr val="accent1"/>
+          </a:fillRef>
+          <a:effectRef idx="1">
+            <a:schemeClr val="accent1"/>
+          </a:effectRef>
+          <a:fontRef idx="minor">
+            <a:schemeClr val="lt1"/>
+          </a:fontRef>
+        </p:style>
+        <p:txBody>
+          <a:bodyPr wrap="square" rtlCol="0">
+            <a:spAutoFit/>
+          </a:bodyPr>
+          <a:lstStyle/>
+          <a:p>
+            <a:pPr algn="ctr"/>
+            <a:r>
+              <a:rPr lang="en-US" dirty="0" smtClean="0"/>
+              <a:t>Multiclass SVM</a:t>
+            </a:r>
+            <a:endParaRPr lang="en-US" dirty="0"/>
+          </a:p>
+        </p:txBody>
+      </p:sp>
+      <p:sp>
+        <p:nvSpPr>
+          <p:cNvPr id="47" name="TextBox 46"/>
+          <p:cNvSpPr txBox="1"/>
+          <p:nvPr/>
+        </p:nvSpPr>
+        <p:spPr>
+          <a:xfrm>
+            <a:off x="600638" y="2554941"/>
+            <a:ext cx="1721224" cy="369332"/>
+          </a:xfrm>
+          <a:prstGeom prst="rect">
+            <a:avLst/>
+          </a:prstGeom>
+          <a:noFill/>
+        </p:spPr>
+        <p:txBody>
+          <a:bodyPr wrap="square" rtlCol="0">
+            <a:spAutoFit/>
+          </a:bodyPr>
+          <a:lstStyle/>
+          <a:p>
+            <a:r>
+              <a:rPr lang="en-US" dirty="0" smtClean="0"/>
+              <a:t>Mobile Browser</a:t>
+            </a:r>
+            <a:endParaRPr lang="en-US" dirty="0"/>
           </a:p>
         </p:txBody>
       </p:sp>
@@ -5750,11 +6579,17 @@
             <p:ph type="title"/>
           </p:nvPr>
         </p:nvSpPr>
-        <p:spPr/>
+        <p:spPr>
+          <a:xfrm>
+            <a:off x="502024" y="0"/>
+            <a:ext cx="3917576" cy="1143000"/>
+          </a:xfrm>
+        </p:spPr>
         <p:txBody>
           <a:bodyPr/>
           <a:lstStyle/>
           <a:p>
+            <a:pPr algn="l"/>
             <a:r>
               <a:rPr lang="en-US" dirty="0" smtClean="0"/>
               <a:t>Results</a:t>
@@ -5773,12 +6608,378 @@
             <p:ph idx="1"/>
           </p:nvPr>
         </p:nvSpPr>
-        <p:spPr/>
-        <p:txBody>
-          <a:bodyPr/>
-          <a:lstStyle/>
-          <a:p>
-            <a:endParaRPr lang="en-US"/>
+        <p:spPr>
+          <a:xfrm>
+            <a:off x="-1" y="936814"/>
+            <a:ext cx="8059271" cy="1313328"/>
+          </a:xfrm>
+        </p:spPr>
+        <p:txBody>
+          <a:bodyPr>
+            <a:normAutofit fontScale="77500" lnSpcReduction="20000"/>
+          </a:bodyPr>
+          <a:lstStyle/>
+          <a:p>
+            <a:r>
+              <a:rPr lang="en-US" dirty="0" smtClean="0"/>
+              <a:t>For testing purposes, each category under test (chosen from our dataset of &gt;53,000 UA strings) was split, where 80% was used for training and 20% used for testing.</a:t>
+            </a:r>
+            <a:endParaRPr lang="en-US" dirty="0"/>
+          </a:p>
+        </p:txBody>
+      </p:sp>
+      <p:graphicFrame>
+        <p:nvGraphicFramePr>
+          <p:cNvPr id="6" name="Table 5"/>
+          <p:cNvGraphicFramePr>
+            <a:graphicFrameLocks noGrp="1"/>
+          </p:cNvGraphicFramePr>
+          <p:nvPr/>
+        </p:nvGraphicFramePr>
+        <p:xfrm>
+          <a:off x="179293" y="1972232"/>
+          <a:ext cx="8633012" cy="2906063"/>
+        </p:xfrm>
+        <a:graphic>
+          <a:graphicData uri="http://schemas.openxmlformats.org/drawingml/2006/table">
+            <a:tbl>
+              <a:tblPr firstRow="1" bandRow="1">
+                <a:tableStyleId>{5C22544A-7EE6-4342-B048-85BDC9FD1C3A}</a:tableStyleId>
+              </a:tblPr>
+              <a:tblGrid>
+                <a:gridCol w="2158253"/>
+                <a:gridCol w="2395819"/>
+                <a:gridCol w="1920687"/>
+                <a:gridCol w="2158253"/>
+              </a:tblGrid>
+              <a:tr h="448239">
+                <a:tc>
+                  <a:txBody>
+                    <a:bodyPr/>
+                    <a:lstStyle/>
+                    <a:p>
+                      <a:pPr algn="r"/>
+                      <a:r>
+                        <a:rPr lang="en-US" dirty="0" smtClean="0"/>
+                        <a:t>Kernel\Accuracy</a:t>
+                      </a:r>
+                      <a:endParaRPr lang="en-US" dirty="0"/>
+                    </a:p>
+                  </a:txBody>
+                  <a:tcPr>
+                    <a:solidFill>
+                      <a:schemeClr val="accent5"/>
+                    </a:solidFill>
+                  </a:tcPr>
+                </a:tc>
+                <a:tc>
+                  <a:txBody>
+                    <a:bodyPr/>
+                    <a:lstStyle/>
+                    <a:p>
+                      <a:r>
+                        <a:rPr lang="en-US" baseline="0" dirty="0" smtClean="0"/>
+                        <a:t>Browser v. </a:t>
+                      </a:r>
+                      <a:r>
+                        <a:rPr lang="en-US" dirty="0" smtClean="0"/>
+                        <a:t>MB </a:t>
+                      </a:r>
+                      <a:r>
+                        <a:rPr lang="en-US" baseline="0" dirty="0" smtClean="0"/>
+                        <a:t>v. </a:t>
+                      </a:r>
+                      <a:r>
+                        <a:rPr lang="en-US" baseline="0" dirty="0" err="1" smtClean="0"/>
+                        <a:t>Bot</a:t>
+                      </a:r>
+                      <a:endParaRPr lang="en-US" dirty="0"/>
+                    </a:p>
+                  </a:txBody>
+                  <a:tcPr/>
+                </a:tc>
+                <a:tc>
+                  <a:txBody>
+                    <a:bodyPr/>
+                    <a:lstStyle/>
+                    <a:p>
+                      <a:r>
+                        <a:rPr lang="en-US" dirty="0" smtClean="0"/>
+                        <a:t>Family</a:t>
+                      </a:r>
+                      <a:endParaRPr lang="en-US" dirty="0"/>
+                    </a:p>
+                  </a:txBody>
+                  <a:tcPr/>
+                </a:tc>
+                <a:tc>
+                  <a:txBody>
+                    <a:bodyPr/>
+                    <a:lstStyle/>
+                    <a:p>
+                      <a:r>
+                        <a:rPr lang="en-US" dirty="0" smtClean="0"/>
+                        <a:t>OS</a:t>
+                      </a:r>
+                      <a:endParaRPr lang="en-US" dirty="0"/>
+                    </a:p>
+                  </a:txBody>
+                  <a:tcPr/>
+                </a:tc>
+              </a:tr>
+              <a:tr h="614456">
+                <a:tc>
+                  <a:txBody>
+                    <a:bodyPr/>
+                    <a:lstStyle/>
+                    <a:p>
+                      <a:pPr algn="r"/>
+                      <a:r>
+                        <a:rPr lang="en-US" dirty="0" smtClean="0"/>
+                        <a:t>Linear </a:t>
+                      </a:r>
+                      <a:endParaRPr lang="en-US" dirty="0"/>
+                    </a:p>
+                  </a:txBody>
+                  <a:tcPr/>
+                </a:tc>
+                <a:tc>
+                  <a:txBody>
+                    <a:bodyPr/>
+                    <a:lstStyle/>
+                    <a:p>
+                      <a:pPr algn="r"/>
+                      <a:endParaRPr lang="en-US" dirty="0"/>
+                    </a:p>
+                  </a:txBody>
+                  <a:tcPr/>
+                </a:tc>
+                <a:tc>
+                  <a:txBody>
+                    <a:bodyPr/>
+                    <a:lstStyle/>
+                    <a:p>
+                      <a:pPr algn="r"/>
+                      <a:endParaRPr lang="en-US" dirty="0"/>
+                    </a:p>
+                  </a:txBody>
+                  <a:tcPr/>
+                </a:tc>
+                <a:tc>
+                  <a:txBody>
+                    <a:bodyPr/>
+                    <a:lstStyle/>
+                    <a:p>
+                      <a:pPr algn="r"/>
+                      <a:endParaRPr lang="en-US"/>
+                    </a:p>
+                  </a:txBody>
+                  <a:tcPr/>
+                </a:tc>
+              </a:tr>
+              <a:tr h="614456">
+                <a:tc>
+                  <a:txBody>
+                    <a:bodyPr/>
+                    <a:lstStyle/>
+                    <a:p>
+                      <a:pPr algn="r"/>
+                      <a:r>
+                        <a:rPr lang="en-US" dirty="0" smtClean="0"/>
+                        <a:t>RBF</a:t>
+                      </a:r>
+                      <a:endParaRPr lang="en-US" dirty="0"/>
+                    </a:p>
+                  </a:txBody>
+                  <a:tcPr/>
+                </a:tc>
+                <a:tc>
+                  <a:txBody>
+                    <a:bodyPr/>
+                    <a:lstStyle/>
+                    <a:p>
+                      <a:pPr algn="r"/>
+                      <a:endParaRPr lang="en-US" dirty="0"/>
+                    </a:p>
+                  </a:txBody>
+                  <a:tcPr/>
+                </a:tc>
+                <a:tc>
+                  <a:txBody>
+                    <a:bodyPr/>
+                    <a:lstStyle/>
+                    <a:p>
+                      <a:pPr algn="r"/>
+                      <a:endParaRPr lang="en-US" dirty="0"/>
+                    </a:p>
+                  </a:txBody>
+                  <a:tcPr/>
+                </a:tc>
+                <a:tc>
+                  <a:txBody>
+                    <a:bodyPr/>
+                    <a:lstStyle/>
+                    <a:p>
+                      <a:pPr algn="r"/>
+                      <a:endParaRPr lang="en-US" dirty="0"/>
+                    </a:p>
+                  </a:txBody>
+                  <a:tcPr/>
+                </a:tc>
+              </a:tr>
+              <a:tr h="614456">
+                <a:tc>
+                  <a:txBody>
+                    <a:bodyPr/>
+                    <a:lstStyle/>
+                    <a:p>
+                      <a:pPr algn="r"/>
+                      <a:r>
+                        <a:rPr lang="en-US" dirty="0" smtClean="0"/>
+                        <a:t>Edit</a:t>
+                      </a:r>
+                      <a:r>
+                        <a:rPr lang="en-US" baseline="0" dirty="0" smtClean="0"/>
+                        <a:t> String</a:t>
+                      </a:r>
+                      <a:endParaRPr lang="en-US" dirty="0"/>
+                    </a:p>
+                  </a:txBody>
+                  <a:tcPr/>
+                </a:tc>
+                <a:tc>
+                  <a:txBody>
+                    <a:bodyPr/>
+                    <a:lstStyle/>
+                    <a:p>
+                      <a:pPr algn="r"/>
+                      <a:endParaRPr lang="en-US" dirty="0"/>
+                    </a:p>
+                  </a:txBody>
+                  <a:tcPr/>
+                </a:tc>
+                <a:tc>
+                  <a:txBody>
+                    <a:bodyPr/>
+                    <a:lstStyle/>
+                    <a:p>
+                      <a:pPr algn="r"/>
+                      <a:endParaRPr lang="en-US" dirty="0"/>
+                    </a:p>
+                  </a:txBody>
+                  <a:tcPr/>
+                </a:tc>
+                <a:tc>
+                  <a:txBody>
+                    <a:bodyPr/>
+                    <a:lstStyle/>
+                    <a:p>
+                      <a:pPr algn="r"/>
+                      <a:endParaRPr lang="en-US" dirty="0"/>
+                    </a:p>
+                  </a:txBody>
+                  <a:tcPr/>
+                </a:tc>
+              </a:tr>
+              <a:tr h="614456">
+                <a:tc>
+                  <a:txBody>
+                    <a:bodyPr/>
+                    <a:lstStyle/>
+                    <a:p>
+                      <a:pPr algn="r"/>
+                      <a:r>
+                        <a:rPr lang="en-US" dirty="0" smtClean="0"/>
+                        <a:t>Subsequence</a:t>
+                      </a:r>
+                      <a:endParaRPr lang="en-US" dirty="0"/>
+                    </a:p>
+                  </a:txBody>
+                  <a:tcPr/>
+                </a:tc>
+                <a:tc>
+                  <a:txBody>
+                    <a:bodyPr/>
+                    <a:lstStyle/>
+                    <a:p>
+                      <a:pPr algn="r"/>
+                      <a:endParaRPr lang="en-US" dirty="0"/>
+                    </a:p>
+                  </a:txBody>
+                  <a:tcPr/>
+                </a:tc>
+                <a:tc>
+                  <a:txBody>
+                    <a:bodyPr/>
+                    <a:lstStyle/>
+                    <a:p>
+                      <a:pPr algn="r"/>
+                      <a:endParaRPr lang="en-US" dirty="0"/>
+                    </a:p>
+                  </a:txBody>
+                  <a:tcPr/>
+                </a:tc>
+                <a:tc>
+                  <a:txBody>
+                    <a:bodyPr/>
+                    <a:lstStyle/>
+                    <a:p>
+                      <a:pPr algn="r"/>
+                      <a:endParaRPr lang="en-US" dirty="0"/>
+                    </a:p>
+                  </a:txBody>
+                  <a:tcPr/>
+                </a:tc>
+              </a:tr>
+            </a:tbl>
+          </a:graphicData>
+        </a:graphic>
+      </p:graphicFrame>
+      <p:sp>
+        <p:nvSpPr>
+          <p:cNvPr id="7" name="TextBox 6"/>
+          <p:cNvSpPr txBox="1"/>
+          <p:nvPr/>
+        </p:nvSpPr>
+        <p:spPr>
+          <a:xfrm>
+            <a:off x="161365" y="5136771"/>
+            <a:ext cx="8713694" cy="1661993"/>
+          </a:xfrm>
+          <a:prstGeom prst="rect">
+            <a:avLst/>
+          </a:prstGeom>
+          <a:noFill/>
+        </p:spPr>
+        <p:txBody>
+          <a:bodyPr wrap="square" rtlCol="0">
+            <a:spAutoFit/>
+          </a:bodyPr>
+          <a:lstStyle/>
+          <a:p>
+            <a:r>
+              <a:rPr lang="en-US" sz="2400" dirty="0" smtClean="0">
+                <a:latin typeface="+mj-lt"/>
+              </a:rPr>
+              <a:t>Conclusions:</a:t>
+            </a:r>
+          </a:p>
+          <a:p>
+            <a:r>
+              <a:rPr lang="en-US" sz="2400" dirty="0" smtClean="0">
+                <a:latin typeface="+mj-lt"/>
+              </a:rPr>
+              <a:t>	</a:t>
+            </a:r>
+            <a:r>
+              <a:rPr lang="en-US" dirty="0" smtClean="0">
+                <a:latin typeface="+mj-lt"/>
+              </a:rPr>
+              <a:t>Robust classification possible.  Robots easy to tell from browsers, even with attempts at deception.  Browser and OS are easily classified by Linear classifier.  Edit string and Subsequence Kernels, despite additional complexity over Linear Kernel and inclusion of position and order information, do not outperform the linear classifier.  </a:t>
+            </a:r>
+            <a:endParaRPr lang="en-US" sz="2400" dirty="0">
+              <a:latin typeface="+mj-lt"/>
+            </a:endParaRPr>
           </a:p>
         </p:txBody>
       </p:sp>

</xml_diff>

<commit_message>
left Maulharness in usable state
</commit_message>
<xml_diff>
--- a/poster/poster.pptx
+++ b/poster/poster.pptx
@@ -3516,14 +3516,14 @@
       </p:sp>
       <p:sp>
         <p:nvSpPr>
-          <p:cNvPr id="5" name="TextBox 4"/>
+          <p:cNvPr id="22" name="TextBox 21"/>
           <p:cNvSpPr txBox="1"/>
           <p:nvPr/>
         </p:nvSpPr>
         <p:spPr>
           <a:xfrm>
-            <a:off x="699247" y="2784444"/>
-            <a:ext cx="1072280" cy="829809"/>
+            <a:off x="215754" y="5319117"/>
+            <a:ext cx="9144000" cy="1723549"/>
           </a:xfrm>
           <a:prstGeom prst="rect">
             <a:avLst/>
@@ -3537,57 +3537,188 @@
           <a:lstStyle/>
           <a:p>
             <a:r>
-              <a:rPr lang="en-US" sz="2800" dirty="0" smtClean="0"/>
-              <a:t>Web Entity</a:t>
-            </a:r>
-            <a:endParaRPr lang="en-US" sz="2800" dirty="0"/>
-          </a:p>
-        </p:txBody>
-      </p:sp>
-      <p:sp>
-        <p:nvSpPr>
-          <p:cNvPr id="19" name="TextBox 18"/>
-          <p:cNvSpPr txBox="1"/>
-          <p:nvPr/>
-        </p:nvSpPr>
-        <p:spPr>
-          <a:xfrm>
-            <a:off x="4255643" y="1033050"/>
-            <a:ext cx="1331414" cy="321216"/>
-          </a:xfrm>
-          <a:prstGeom prst="rect">
-            <a:avLst/>
-          </a:prstGeom>
-          <a:noFill/>
-        </p:spPr>
-        <p:txBody>
-          <a:bodyPr wrap="square" rtlCol="0">
-            <a:spAutoFit/>
-          </a:bodyPr>
-          <a:lstStyle/>
-          <a:p>
-            <a:r>
-              <a:rPr lang="en-US" dirty="0" smtClean="0"/>
-              <a:t>HTTP Request</a:t>
-            </a:r>
-            <a:endParaRPr lang="en-US" dirty="0"/>
+              <a:rPr lang="en-US" u="sng" dirty="0" smtClean="0"/>
+              <a:t>Typical User Agent Strings:</a:t>
+            </a:r>
+          </a:p>
+          <a:p>
+            <a:endParaRPr lang="en-US" sz="400" dirty="0" smtClean="0"/>
+          </a:p>
+          <a:p>
+            <a:r>
+              <a:rPr lang="en-US" sz="1200" b="1" dirty="0" smtClean="0">
+                <a:latin typeface="Arial" pitchFamily="34" charset="0"/>
+                <a:cs typeface="Arial" pitchFamily="34" charset="0"/>
+              </a:rPr>
+              <a:t>Mozilla/4.0 (compatible; MSIE 5.01; Windows NT 5.0; SV1; .NET CLR 1.1.4322; .NET CLR 1.0.3705; .NET CLR 2.0.50727)</a:t>
+            </a:r>
+          </a:p>
+          <a:p>
+            <a:r>
+              <a:rPr lang="en-US" sz="1200" b="1" dirty="0" smtClean="0">
+                <a:latin typeface="Arial" pitchFamily="34" charset="0"/>
+                <a:cs typeface="Arial" pitchFamily="34" charset="0"/>
+              </a:rPr>
+              <a:t>Mozilla/5.0 (compatible; </a:t>
+            </a:r>
+            <a:r>
+              <a:rPr lang="en-US" sz="1200" b="1" dirty="0" err="1" smtClean="0">
+                <a:latin typeface="Arial" pitchFamily="34" charset="0"/>
+                <a:cs typeface="Arial" pitchFamily="34" charset="0"/>
+              </a:rPr>
+              <a:t>Googlebot</a:t>
+            </a:r>
+            <a:r>
+              <a:rPr lang="en-US" sz="1200" b="1" dirty="0" smtClean="0">
+                <a:latin typeface="Arial" pitchFamily="34" charset="0"/>
+                <a:cs typeface="Arial" pitchFamily="34" charset="0"/>
+              </a:rPr>
+              <a:t>/2.1; http://www.google.com/bot.html)</a:t>
+            </a:r>
+          </a:p>
+          <a:p>
+            <a:r>
+              <a:rPr lang="en-US" sz="1200" b="1" dirty="0" smtClean="0">
+                <a:latin typeface="Arial" pitchFamily="34" charset="0"/>
+                <a:cs typeface="Arial" pitchFamily="34" charset="0"/>
+              </a:rPr>
+              <a:t>Mozilla/5.0 (Windows; U; Windows NT 5.1; de; rv:1.9.2.3) Gecko/20100401 Firefox/3.6.3 (.NET CLR 3.5.</a:t>
+            </a:r>
+          </a:p>
+          <a:p>
+            <a:r>
+              <a:rPr lang="en-US" sz="1200" b="1" dirty="0" smtClean="0">
+                <a:latin typeface="Arial" pitchFamily="34" charset="0"/>
+                <a:cs typeface="Arial" pitchFamily="34" charset="0"/>
+              </a:rPr>
+              <a:t>30729) (</a:t>
+            </a:r>
+            <a:r>
+              <a:rPr lang="en-US" sz="1200" b="1" dirty="0" err="1" smtClean="0">
+                <a:latin typeface="Arial" pitchFamily="34" charset="0"/>
+                <a:cs typeface="Arial" pitchFamily="34" charset="0"/>
+              </a:rPr>
+              <a:t>Prevx</a:t>
+            </a:r>
+            <a:r>
+              <a:rPr lang="en-US" sz="1200" b="1" dirty="0" smtClean="0">
+                <a:latin typeface="Arial" pitchFamily="34" charset="0"/>
+                <a:cs typeface="Arial" pitchFamily="34" charset="0"/>
+              </a:rPr>
+              <a:t> 3.0.5)</a:t>
+            </a:r>
+          </a:p>
+          <a:p>
+            <a:r>
+              <a:rPr lang="en-US" sz="1200" b="1" dirty="0" err="1" smtClean="0">
+                <a:latin typeface="Arial" pitchFamily="34" charset="0"/>
+                <a:cs typeface="Arial" pitchFamily="34" charset="0"/>
+              </a:rPr>
+              <a:t>BaiduImagespider</a:t>
+            </a:r>
+            <a:r>
+              <a:rPr lang="en-US" sz="1200" b="1" dirty="0" smtClean="0">
+                <a:latin typeface="Arial" pitchFamily="34" charset="0"/>
+                <a:cs typeface="Arial" pitchFamily="34" charset="0"/>
+              </a:rPr>
+              <a:t>+(+http://help.baidu.jp/system/05.html)</a:t>
+            </a:r>
+          </a:p>
+          <a:p>
+            <a:endParaRPr lang="en-US" sz="1200" b="1" dirty="0" smtClean="0">
+              <a:latin typeface="Arial" pitchFamily="34" charset="0"/>
+              <a:cs typeface="Arial" pitchFamily="34" charset="0"/>
+            </a:endParaRPr>
+          </a:p>
+          <a:p>
+            <a:r>
+              <a:rPr lang="en-US" sz="1200" b="1" dirty="0" smtClean="0">
+                <a:latin typeface="Arial" pitchFamily="34" charset="0"/>
+                <a:cs typeface="Arial" pitchFamily="34" charset="0"/>
+              </a:rPr>
+              <a:t> </a:t>
+            </a:r>
+            <a:endParaRPr lang="en-US" sz="1200" b="1" dirty="0">
+              <a:latin typeface="Arial" pitchFamily="34" charset="0"/>
+              <a:cs typeface="Arial" pitchFamily="34" charset="0"/>
+            </a:endParaRPr>
           </a:p>
         </p:txBody>
       </p:sp>
       <p:grpSp>
         <p:nvGrpSpPr>
-          <p:cNvPr id="30" name="Group 29"/>
+          <p:cNvPr id="23" name="Group 22"/>
           <p:cNvGrpSpPr/>
           <p:nvPr/>
         </p:nvGrpSpPr>
         <p:grpSpPr>
           <a:xfrm>
-            <a:off x="1646432" y="1140282"/>
-            <a:ext cx="6887968" cy="4047857"/>
-            <a:chOff x="1089066" y="1335640"/>
-            <a:chExt cx="7919729" cy="4654192"/>
+            <a:off x="370479" y="991953"/>
+            <a:ext cx="8255593" cy="4196186"/>
+            <a:chOff x="658151" y="991953"/>
+            <a:chExt cx="8255593" cy="4196186"/>
           </a:xfrm>
         </p:grpSpPr>
+        <p:sp>
+          <p:nvSpPr>
+            <p:cNvPr id="5" name="TextBox 4"/>
+            <p:cNvSpPr txBox="1"/>
+            <p:nvPr/>
+          </p:nvSpPr>
+          <p:spPr>
+            <a:xfrm>
+              <a:off x="658151" y="2784444"/>
+              <a:ext cx="1072280" cy="829809"/>
+            </a:xfrm>
+            <a:prstGeom prst="rect">
+              <a:avLst/>
+            </a:prstGeom>
+            <a:noFill/>
+          </p:spPr>
+          <p:txBody>
+            <a:bodyPr wrap="square" rtlCol="0">
+              <a:spAutoFit/>
+            </a:bodyPr>
+            <a:lstStyle/>
+            <a:p>
+              <a:r>
+                <a:rPr lang="en-US" sz="2800" dirty="0" smtClean="0"/>
+                <a:t>Web Entity</a:t>
+              </a:r>
+              <a:endParaRPr lang="en-US" sz="2800" dirty="0"/>
+            </a:p>
+          </p:txBody>
+        </p:sp>
+        <p:sp>
+          <p:nvSpPr>
+            <p:cNvPr id="19" name="TextBox 18"/>
+            <p:cNvSpPr txBox="1"/>
+            <p:nvPr/>
+          </p:nvSpPr>
+          <p:spPr>
+            <a:xfrm>
+              <a:off x="4193998" y="991953"/>
+              <a:ext cx="1538982" cy="369332"/>
+            </a:xfrm>
+            <a:prstGeom prst="rect">
+              <a:avLst/>
+            </a:prstGeom>
+            <a:noFill/>
+          </p:spPr>
+          <p:txBody>
+            <a:bodyPr wrap="square" rtlCol="0">
+              <a:spAutoFit/>
+            </a:bodyPr>
+            <a:lstStyle/>
+            <a:p>
+              <a:r>
+                <a:rPr lang="en-US" dirty="0" smtClean="0"/>
+                <a:t>HTTP Request</a:t>
+              </a:r>
+              <a:endParaRPr lang="en-US" dirty="0"/>
+            </a:p>
+          </p:txBody>
+        </p:sp>
         <p:sp>
           <p:nvSpPr>
             <p:cNvPr id="4" name="Left Brace 3"/>
@@ -3596,8 +3727,8 @@
           </p:nvSpPr>
           <p:spPr>
             <a:xfrm>
-              <a:off x="1089066" y="1520572"/>
-              <a:ext cx="482887" cy="4356243"/>
+              <a:off x="1605336" y="1301122"/>
+              <a:ext cx="419978" cy="3788724"/>
             </a:xfrm>
             <a:prstGeom prst="leftBrace">
               <a:avLst>
@@ -3647,8 +3778,8 @@
           </p:blipFill>
           <p:spPr bwMode="auto">
             <a:xfrm>
-              <a:off x="1748078" y="1693948"/>
-              <a:ext cx="1293081" cy="1293081"/>
+              <a:off x="2178494" y="1451911"/>
+              <a:ext cx="1124622" cy="1124622"/>
             </a:xfrm>
             <a:prstGeom prst="rect">
               <a:avLst/>
@@ -3664,8 +3795,8 @@
           </p:nvSpPr>
           <p:spPr>
             <a:xfrm>
-              <a:off x="1931549" y="1335640"/>
-              <a:ext cx="1222560" cy="495430"/>
+              <a:off x="2379159" y="1140282"/>
+              <a:ext cx="1063288" cy="430887"/>
             </a:xfrm>
             <a:prstGeom prst="rect">
               <a:avLst/>
@@ -3703,8 +3834,8 @@
           </p:blipFill>
           <p:spPr bwMode="auto">
             <a:xfrm>
-              <a:off x="1563142" y="3816415"/>
-              <a:ext cx="1728454" cy="2019300"/>
+              <a:off x="2017651" y="3297869"/>
+              <a:ext cx="1503276" cy="1756231"/>
             </a:xfrm>
             <a:prstGeom prst="rect">
               <a:avLst/>
@@ -3720,8 +3851,8 @@
           </p:nvSpPr>
           <p:spPr>
             <a:xfrm>
-              <a:off x="1839081" y="3421287"/>
-              <a:ext cx="1253183" cy="495430"/>
+              <a:off x="2257641" y="2954217"/>
+              <a:ext cx="1089922" cy="430887"/>
             </a:xfrm>
             <a:prstGeom prst="rect">
               <a:avLst/>
@@ -3750,8 +3881,8 @@
           </p:nvSpPr>
           <p:spPr>
             <a:xfrm rot="10800000">
-              <a:off x="3419587" y="1549683"/>
-              <a:ext cx="482887" cy="4356243"/>
+              <a:off x="3632243" y="1326440"/>
+              <a:ext cx="419978" cy="3788724"/>
             </a:xfrm>
             <a:prstGeom prst="leftBrace">
               <a:avLst>
@@ -3792,8 +3923,8 @@
           </p:nvSpPr>
           <p:spPr>
             <a:xfrm>
-              <a:off x="4119937" y="1623312"/>
-              <a:ext cx="2229493" cy="2476072"/>
+              <a:off x="4241353" y="1390477"/>
+              <a:ext cx="1939041" cy="2153496"/>
             </a:xfrm>
             <a:prstGeom prst="rightArrowCallout">
               <a:avLst/>
@@ -3845,6 +3976,11 @@
                 </a:rPr>
                 <a:t>…</a:t>
               </a:r>
+              <a:endParaRPr lang="en-US" dirty="0" smtClean="0">
+                <a:solidFill>
+                  <a:schemeClr val="tx1"/>
+                </a:solidFill>
+              </a:endParaRPr>
             </a:p>
             <a:p>
               <a:pPr algn="ctr"/>
@@ -3913,8 +4049,8 @@
           </p:nvSpPr>
           <p:spPr>
             <a:xfrm>
-              <a:off x="3832265" y="4397337"/>
-              <a:ext cx="2239763" cy="1592495"/>
+              <a:off x="3991158" y="3803110"/>
+              <a:ext cx="1947973" cy="1385029"/>
             </a:xfrm>
             <a:prstGeom prst="leftArrow">
               <a:avLst/>
@@ -3957,8 +4093,8 @@
           </p:nvSpPr>
           <p:spPr>
             <a:xfrm>
-              <a:off x="6152514" y="1919544"/>
-              <a:ext cx="482887" cy="3515472"/>
+              <a:off x="6009132" y="1648117"/>
+              <a:ext cx="419978" cy="3057486"/>
             </a:xfrm>
             <a:prstGeom prst="leftBrace">
               <a:avLst>
@@ -4008,8 +4144,8 @@
           </p:blipFill>
           <p:spPr bwMode="auto">
             <a:xfrm>
-              <a:off x="6618020" y="2691822"/>
-              <a:ext cx="2390775" cy="1914525"/>
+              <a:off x="6413993" y="2319784"/>
+              <a:ext cx="2079311" cy="1665106"/>
             </a:xfrm>
             <a:prstGeom prst="rect">
               <a:avLst/>
@@ -4025,8 +4161,8 @@
           </p:nvSpPr>
           <p:spPr>
             <a:xfrm>
-              <a:off x="7315197" y="2188393"/>
-              <a:ext cx="1068516" cy="495430"/>
+              <a:off x="7020343" y="1881941"/>
+              <a:ext cx="929313" cy="430887"/>
             </a:xfrm>
             <a:prstGeom prst="rect">
               <a:avLst/>
@@ -4055,8 +4191,8 @@
           </p:nvSpPr>
           <p:spPr>
             <a:xfrm>
-              <a:off x="6842589" y="4767204"/>
-              <a:ext cx="2003461" cy="1058238"/>
+              <a:off x="6609305" y="4124792"/>
+              <a:ext cx="1742455" cy="920374"/>
             </a:xfrm>
             <a:prstGeom prst="ellipse">
               <a:avLst/>
@@ -4099,8 +4235,8 @@
           </p:nvSpPr>
           <p:spPr>
             <a:xfrm>
-              <a:off x="2065107" y="3133612"/>
-              <a:ext cx="595900" cy="400110"/>
+              <a:off x="2454221" y="2704019"/>
+              <a:ext cx="518268" cy="347985"/>
             </a:xfrm>
             <a:prstGeom prst="rect">
               <a:avLst/>
@@ -4121,138 +4257,49 @@
             </a:p>
           </p:txBody>
         </p:sp>
+        <p:sp>
+          <p:nvSpPr>
+            <p:cNvPr id="21" name="Left Brace 20"/>
+            <p:cNvSpPr/>
+            <p:nvPr/>
+          </p:nvSpPr>
+          <p:spPr>
+            <a:xfrm rot="10800000">
+              <a:off x="8493766" y="1656681"/>
+              <a:ext cx="419978" cy="3057486"/>
+            </a:xfrm>
+            <a:prstGeom prst="leftBrace">
+              <a:avLst>
+                <a:gd name="adj1" fmla="val 0"/>
+                <a:gd name="adj2" fmla="val 50000"/>
+              </a:avLst>
+            </a:prstGeom>
+            <a:ln w="19050"/>
+          </p:spPr>
+          <p:style>
+            <a:lnRef idx="1">
+              <a:schemeClr val="accent1"/>
+            </a:lnRef>
+            <a:fillRef idx="0">
+              <a:schemeClr val="accent1"/>
+            </a:fillRef>
+            <a:effectRef idx="0">
+              <a:schemeClr val="accent1"/>
+            </a:effectRef>
+            <a:fontRef idx="minor">
+              <a:schemeClr val="tx1"/>
+            </a:fontRef>
+          </p:style>
+          <p:txBody>
+            <a:bodyPr rtlCol="0" anchor="ctr"/>
+            <a:lstStyle/>
+            <a:p>
+              <a:pPr algn="ctr"/>
+              <a:endParaRPr lang="en-US"/>
+            </a:p>
+          </p:txBody>
+        </p:sp>
       </p:grpSp>
-      <p:sp>
-        <p:nvSpPr>
-          <p:cNvPr id="22" name="TextBox 21"/>
-          <p:cNvSpPr txBox="1"/>
-          <p:nvPr/>
-        </p:nvSpPr>
-        <p:spPr>
-          <a:xfrm>
-            <a:off x="0" y="5319117"/>
-            <a:ext cx="9144000" cy="1723549"/>
-          </a:xfrm>
-          <a:prstGeom prst="rect">
-            <a:avLst/>
-          </a:prstGeom>
-          <a:noFill/>
-        </p:spPr>
-        <p:txBody>
-          <a:bodyPr wrap="square" rtlCol="0">
-            <a:spAutoFit/>
-          </a:bodyPr>
-          <a:lstStyle/>
-          <a:p>
-            <a:r>
-              <a:rPr lang="en-US" u="sng" dirty="0" smtClean="0"/>
-              <a:t>Typical User Agent Strings:</a:t>
-            </a:r>
-          </a:p>
-          <a:p>
-            <a:endParaRPr lang="en-US" sz="400" dirty="0" smtClean="0"/>
-          </a:p>
-          <a:p>
-            <a:r>
-              <a:rPr lang="en-US" sz="1200" b="1" dirty="0" smtClean="0">
-                <a:latin typeface="Arial" pitchFamily="34" charset="0"/>
-                <a:cs typeface="Arial" pitchFamily="34" charset="0"/>
-              </a:rPr>
-              <a:t>Mozilla/4.0 (compatible; MSIE 5.01; Windows NT 5.0; SV1; .NET CLR 1.1.4322; .NET CLR 1.0.3705; .NET CLR 2.0.50727)</a:t>
-            </a:r>
-          </a:p>
-          <a:p>
-            <a:r>
-              <a:rPr lang="en-US" sz="1200" b="1" dirty="0" smtClean="0">
-                <a:latin typeface="Arial" pitchFamily="34" charset="0"/>
-                <a:cs typeface="Arial" pitchFamily="34" charset="0"/>
-              </a:rPr>
-              <a:t>Mozilla/5.0 (compatible; </a:t>
-            </a:r>
-            <a:r>
-              <a:rPr lang="en-US" sz="1200" b="1" dirty="0" err="1" smtClean="0">
-                <a:latin typeface="Arial" pitchFamily="34" charset="0"/>
-                <a:cs typeface="Arial" pitchFamily="34" charset="0"/>
-              </a:rPr>
-              <a:t>Googlebot</a:t>
-            </a:r>
-            <a:r>
-              <a:rPr lang="en-US" sz="1200" b="1" dirty="0" smtClean="0">
-                <a:latin typeface="Arial" pitchFamily="34" charset="0"/>
-                <a:cs typeface="Arial" pitchFamily="34" charset="0"/>
-              </a:rPr>
-              <a:t>/2.1; http://www.google.com/bot.html)</a:t>
-            </a:r>
-          </a:p>
-          <a:p>
-            <a:r>
-              <a:rPr lang="en-US" sz="1200" b="1" dirty="0" smtClean="0">
-                <a:latin typeface="Arial" pitchFamily="34" charset="0"/>
-                <a:cs typeface="Arial" pitchFamily="34" charset="0"/>
-              </a:rPr>
-              <a:t>Mozilla/5.0 (Windows; U; Windows NT 5.1; de; rv:1.9.2.3) Gecko/20100401 Firefox/3.6.3 (.NET CLR 3.5.</a:t>
-            </a:r>
-          </a:p>
-          <a:p>
-            <a:r>
-              <a:rPr lang="en-US" sz="1200" b="1" dirty="0" smtClean="0">
-                <a:latin typeface="Arial" pitchFamily="34" charset="0"/>
-                <a:cs typeface="Arial" pitchFamily="34" charset="0"/>
-              </a:rPr>
-              <a:t>30729) (</a:t>
-            </a:r>
-            <a:r>
-              <a:rPr lang="en-US" sz="1200" b="1" dirty="0" err="1" smtClean="0">
-                <a:latin typeface="Arial" pitchFamily="34" charset="0"/>
-                <a:cs typeface="Arial" pitchFamily="34" charset="0"/>
-              </a:rPr>
-              <a:t>Prevx</a:t>
-            </a:r>
-            <a:r>
-              <a:rPr lang="en-US" sz="1200" b="1" dirty="0" smtClean="0">
-                <a:latin typeface="Arial" pitchFamily="34" charset="0"/>
-                <a:cs typeface="Arial" pitchFamily="34" charset="0"/>
-              </a:rPr>
-              <a:t> 3.0.5)</a:t>
-            </a:r>
-          </a:p>
-          <a:p>
-            <a:r>
-              <a:rPr lang="en-US" sz="1200" b="1" dirty="0" err="1" smtClean="0">
-                <a:latin typeface="Arial" pitchFamily="34" charset="0"/>
-                <a:cs typeface="Arial" pitchFamily="34" charset="0"/>
-              </a:rPr>
-              <a:t>BaiduImagespider</a:t>
-            </a:r>
-            <a:r>
-              <a:rPr lang="en-US" sz="1200" b="1" dirty="0" smtClean="0">
-                <a:latin typeface="Arial" pitchFamily="34" charset="0"/>
-                <a:cs typeface="Arial" pitchFamily="34" charset="0"/>
-              </a:rPr>
-              <a:t>+(+http://help.baidu.jp/system/05.html)</a:t>
-            </a:r>
-          </a:p>
-          <a:p>
-            <a:endParaRPr lang="en-US" sz="1200" b="1" dirty="0" smtClean="0">
-              <a:latin typeface="Arial" pitchFamily="34" charset="0"/>
-              <a:cs typeface="Arial" pitchFamily="34" charset="0"/>
-            </a:endParaRPr>
-          </a:p>
-          <a:p>
-            <a:r>
-              <a:rPr lang="en-US" sz="1200" b="1" dirty="0" smtClean="0">
-                <a:latin typeface="Arial" pitchFamily="34" charset="0"/>
-                <a:cs typeface="Arial" pitchFamily="34" charset="0"/>
-              </a:rPr>
-              <a:t> </a:t>
-            </a:r>
-            <a:endParaRPr lang="en-US" sz="1200" b="1" dirty="0">
-              <a:latin typeface="Arial" pitchFamily="34" charset="0"/>
-              <a:cs typeface="Arial" pitchFamily="34" charset="0"/>
-            </a:endParaRPr>
-          </a:p>
-        </p:txBody>
-      </p:sp>
     </p:spTree>
   </p:cSld>
   <p:clrMapOvr>
@@ -5481,713 +5528,6 @@
       </p:sp>
       <p:sp>
         <p:nvSpPr>
-          <p:cNvPr id="4" name="TextBox 3"/>
-          <p:cNvSpPr txBox="1"/>
-          <p:nvPr/>
-        </p:nvSpPr>
-        <p:spPr>
-          <a:xfrm>
-            <a:off x="2147303" y="1643865"/>
-            <a:ext cx="986319" cy="369332"/>
-          </a:xfrm>
-          <a:prstGeom prst="rect">
-            <a:avLst/>
-          </a:prstGeom>
-          <a:noFill/>
-        </p:spPr>
-        <p:txBody>
-          <a:bodyPr wrap="square" rtlCol="0">
-            <a:spAutoFit/>
-          </a:bodyPr>
-          <a:lstStyle/>
-          <a:p>
-            <a:r>
-              <a:rPr lang="en-US" dirty="0" smtClean="0"/>
-              <a:t>Browser   </a:t>
-            </a:r>
-            <a:endParaRPr lang="en-US" dirty="0"/>
-          </a:p>
-        </p:txBody>
-      </p:sp>
-      <p:sp>
-        <p:nvSpPr>
-          <p:cNvPr id="9" name="TextBox 8"/>
-          <p:cNvSpPr txBox="1"/>
-          <p:nvPr/>
-        </p:nvSpPr>
-        <p:spPr>
-          <a:xfrm>
-            <a:off x="136787" y="1643866"/>
-            <a:ext cx="534255" cy="369332"/>
-          </a:xfrm>
-          <a:prstGeom prst="rect">
-            <a:avLst/>
-          </a:prstGeom>
-          <a:noFill/>
-        </p:spPr>
-        <p:txBody>
-          <a:bodyPr wrap="square" rtlCol="0">
-            <a:spAutoFit/>
-          </a:bodyPr>
-          <a:lstStyle/>
-          <a:p>
-            <a:r>
-              <a:rPr lang="en-US" dirty="0" err="1" smtClean="0"/>
-              <a:t>Bot</a:t>
-            </a:r>
-            <a:endParaRPr lang="en-US" dirty="0"/>
-          </a:p>
-        </p:txBody>
-      </p:sp>
-      <p:cxnSp>
-        <p:nvCxnSpPr>
-          <p:cNvPr id="22" name="Straight Connector 21"/>
-          <p:cNvCxnSpPr>
-            <a:stCxn id="9" idx="3"/>
-            <a:endCxn id="4" idx="1"/>
-          </p:cNvCxnSpPr>
-          <p:nvPr/>
-        </p:nvCxnSpPr>
-        <p:spPr>
-          <a:xfrm flipV="1">
-            <a:off x="671042" y="1828531"/>
-            <a:ext cx="1476261" cy="1"/>
-          </a:xfrm>
-          <a:prstGeom prst="line">
-            <a:avLst/>
-          </a:prstGeom>
-          <a:ln w="19050">
-            <a:headEnd type="oval"/>
-            <a:tailEnd type="oval"/>
-          </a:ln>
-        </p:spPr>
-        <p:style>
-          <a:lnRef idx="1">
-            <a:schemeClr val="accent1"/>
-          </a:lnRef>
-          <a:fillRef idx="0">
-            <a:schemeClr val="accent1"/>
-          </a:fillRef>
-          <a:effectRef idx="0">
-            <a:schemeClr val="accent1"/>
-          </a:effectRef>
-          <a:fontRef idx="minor">
-            <a:schemeClr val="tx1"/>
-          </a:fontRef>
-        </p:style>
-      </p:cxnSp>
-      <p:cxnSp>
-        <p:nvCxnSpPr>
-          <p:cNvPr id="27" name="Straight Connector 26"/>
-          <p:cNvCxnSpPr>
-            <a:stCxn id="4" idx="2"/>
-          </p:cNvCxnSpPr>
-          <p:nvPr/>
-        </p:nvCxnSpPr>
-        <p:spPr>
-          <a:xfrm rot="16200000" flipH="1">
-            <a:off x="330618" y="4323042"/>
-            <a:ext cx="4644460" cy="24770"/>
-          </a:xfrm>
-          <a:prstGeom prst="line">
-            <a:avLst/>
-          </a:prstGeom>
-          <a:ln w="19050">
-            <a:headEnd type="none"/>
-            <a:tailEnd type="oval"/>
-          </a:ln>
-        </p:spPr>
-        <p:style>
-          <a:lnRef idx="1">
-            <a:schemeClr val="accent1"/>
-          </a:lnRef>
-          <a:fillRef idx="0">
-            <a:schemeClr val="accent1"/>
-          </a:fillRef>
-          <a:effectRef idx="0">
-            <a:schemeClr val="accent1"/>
-          </a:effectRef>
-          <a:fontRef idx="minor">
-            <a:schemeClr val="tx1"/>
-          </a:fontRef>
-        </p:style>
-      </p:cxnSp>
-      <p:cxnSp>
-        <p:nvCxnSpPr>
-          <p:cNvPr id="29" name="Straight Connector 28"/>
-          <p:cNvCxnSpPr/>
-          <p:nvPr/>
-        </p:nvCxnSpPr>
-        <p:spPr>
-          <a:xfrm>
-            <a:off x="2661013" y="2753477"/>
-            <a:ext cx="1284270" cy="0"/>
-          </a:xfrm>
-          <a:prstGeom prst="line">
-            <a:avLst/>
-          </a:prstGeom>
-          <a:ln w="19050">
-            <a:headEnd type="none"/>
-            <a:tailEnd type="oval"/>
-          </a:ln>
-        </p:spPr>
-        <p:style>
-          <a:lnRef idx="1">
-            <a:schemeClr val="accent1"/>
-          </a:lnRef>
-          <a:fillRef idx="0">
-            <a:schemeClr val="accent1"/>
-          </a:fillRef>
-          <a:effectRef idx="0">
-            <a:schemeClr val="accent1"/>
-          </a:effectRef>
-          <a:fontRef idx="minor">
-            <a:schemeClr val="tx1"/>
-          </a:fontRef>
-        </p:style>
-      </p:cxnSp>
-      <p:cxnSp>
-        <p:nvCxnSpPr>
-          <p:cNvPr id="31" name="Straight Connector 30"/>
-          <p:cNvCxnSpPr/>
-          <p:nvPr/>
-        </p:nvCxnSpPr>
-        <p:spPr>
-          <a:xfrm>
-            <a:off x="2669575" y="4940142"/>
-            <a:ext cx="1284270" cy="0"/>
-          </a:xfrm>
-          <a:prstGeom prst="line">
-            <a:avLst/>
-          </a:prstGeom>
-          <a:ln w="19050">
-            <a:headEnd type="none"/>
-            <a:tailEnd type="oval"/>
-          </a:ln>
-        </p:spPr>
-        <p:style>
-          <a:lnRef idx="1">
-            <a:schemeClr val="accent1"/>
-          </a:lnRef>
-          <a:fillRef idx="0">
-            <a:schemeClr val="accent1"/>
-          </a:fillRef>
-          <a:effectRef idx="0">
-            <a:schemeClr val="accent1"/>
-          </a:effectRef>
-          <a:fontRef idx="minor">
-            <a:schemeClr val="tx1"/>
-          </a:fontRef>
-        </p:style>
-      </p:cxnSp>
-      <p:sp>
-        <p:nvSpPr>
-          <p:cNvPr id="32" name="TextBox 31"/>
-          <p:cNvSpPr txBox="1"/>
-          <p:nvPr/>
-        </p:nvSpPr>
-        <p:spPr>
-          <a:xfrm>
-            <a:off x="1058843" y="1160984"/>
-            <a:ext cx="914400" cy="369332"/>
-          </a:xfrm>
-          <a:prstGeom prst="rect">
-            <a:avLst/>
-          </a:prstGeom>
-          <a:noFill/>
-        </p:spPr>
-        <p:txBody>
-          <a:bodyPr wrap="square" rtlCol="0">
-            <a:spAutoFit/>
-          </a:bodyPr>
-          <a:lstStyle/>
-          <a:p>
-            <a:r>
-              <a:rPr lang="en-US" dirty="0" smtClean="0"/>
-              <a:t>Type</a:t>
-            </a:r>
-            <a:endParaRPr lang="en-US" dirty="0"/>
-          </a:p>
-        </p:txBody>
-      </p:sp>
-      <p:cxnSp>
-        <p:nvCxnSpPr>
-          <p:cNvPr id="34" name="Straight Connector 33"/>
-          <p:cNvCxnSpPr/>
-          <p:nvPr/>
-        </p:nvCxnSpPr>
-        <p:spPr>
-          <a:xfrm rot="5400000">
-            <a:off x="1236020" y="1679826"/>
-            <a:ext cx="297952" cy="0"/>
-          </a:xfrm>
-          <a:prstGeom prst="line">
-            <a:avLst/>
-          </a:prstGeom>
-          <a:ln w="19050">
-            <a:headEnd type="none"/>
-            <a:tailEnd type="none"/>
-          </a:ln>
-        </p:spPr>
-        <p:style>
-          <a:lnRef idx="1">
-            <a:schemeClr val="accent1"/>
-          </a:lnRef>
-          <a:fillRef idx="0">
-            <a:schemeClr val="accent1"/>
-          </a:fillRef>
-          <a:effectRef idx="0">
-            <a:schemeClr val="accent1"/>
-          </a:effectRef>
-          <a:fontRef idx="minor">
-            <a:schemeClr val="tx1"/>
-          </a:fontRef>
-        </p:style>
-      </p:cxnSp>
-      <p:sp>
-        <p:nvSpPr>
-          <p:cNvPr id="39" name="TextBox 38"/>
-          <p:cNvSpPr txBox="1"/>
-          <p:nvPr/>
-        </p:nvSpPr>
-        <p:spPr>
-          <a:xfrm>
-            <a:off x="2905883" y="2433265"/>
-            <a:ext cx="914400" cy="369332"/>
-          </a:xfrm>
-          <a:prstGeom prst="rect">
-            <a:avLst/>
-          </a:prstGeom>
-          <a:noFill/>
-        </p:spPr>
-        <p:txBody>
-          <a:bodyPr wrap="square" rtlCol="0">
-            <a:spAutoFit/>
-          </a:bodyPr>
-          <a:lstStyle/>
-          <a:p>
-            <a:r>
-              <a:rPr lang="en-US" dirty="0" smtClean="0"/>
-              <a:t>Family</a:t>
-            </a:r>
-            <a:endParaRPr lang="en-US" dirty="0"/>
-          </a:p>
-        </p:txBody>
-      </p:sp>
-      <p:sp>
-        <p:nvSpPr>
-          <p:cNvPr id="40" name="TextBox 39"/>
-          <p:cNvSpPr txBox="1"/>
-          <p:nvPr/>
-        </p:nvSpPr>
-        <p:spPr>
-          <a:xfrm>
-            <a:off x="3048007" y="4599392"/>
-            <a:ext cx="914400" cy="369332"/>
-          </a:xfrm>
-          <a:prstGeom prst="rect">
-            <a:avLst/>
-          </a:prstGeom>
-          <a:noFill/>
-        </p:spPr>
-        <p:txBody>
-          <a:bodyPr wrap="square" rtlCol="0">
-            <a:spAutoFit/>
-          </a:bodyPr>
-          <a:lstStyle/>
-          <a:p>
-            <a:r>
-              <a:rPr lang="en-US" dirty="0" smtClean="0"/>
-              <a:t>OS</a:t>
-            </a:r>
-            <a:endParaRPr lang="en-US" dirty="0"/>
-          </a:p>
-        </p:txBody>
-      </p:sp>
-      <p:cxnSp>
-        <p:nvCxnSpPr>
-          <p:cNvPr id="42" name="Straight Connector 41"/>
-          <p:cNvCxnSpPr/>
-          <p:nvPr/>
-        </p:nvCxnSpPr>
-        <p:spPr>
-          <a:xfrm rot="16200000" flipH="1">
-            <a:off x="3354517" y="3333963"/>
-            <a:ext cx="1181532" cy="4"/>
-          </a:xfrm>
-          <a:prstGeom prst="line">
-            <a:avLst/>
-          </a:prstGeom>
-          <a:ln w="19050">
-            <a:headEnd type="oval"/>
-            <a:tailEnd type="oval"/>
-          </a:ln>
-        </p:spPr>
-        <p:style>
-          <a:lnRef idx="1">
-            <a:schemeClr val="accent1"/>
-          </a:lnRef>
-          <a:fillRef idx="0">
-            <a:schemeClr val="accent1"/>
-          </a:fillRef>
-          <a:effectRef idx="0">
-            <a:schemeClr val="accent1"/>
-          </a:effectRef>
-          <a:fontRef idx="minor">
-            <a:schemeClr val="tx1"/>
-          </a:fontRef>
-        </p:style>
-      </p:cxnSp>
-      <p:cxnSp>
-        <p:nvCxnSpPr>
-          <p:cNvPr id="49" name="Straight Connector 48"/>
-          <p:cNvCxnSpPr/>
-          <p:nvPr/>
-        </p:nvCxnSpPr>
-        <p:spPr>
-          <a:xfrm>
-            <a:off x="3955557" y="2938411"/>
-            <a:ext cx="811652" cy="0"/>
-          </a:xfrm>
-          <a:prstGeom prst="line">
-            <a:avLst/>
-          </a:prstGeom>
-          <a:ln w="19050">
-            <a:headEnd type="none"/>
-            <a:tailEnd type="oval"/>
-          </a:ln>
-        </p:spPr>
-        <p:style>
-          <a:lnRef idx="1">
-            <a:schemeClr val="accent1"/>
-          </a:lnRef>
-          <a:fillRef idx="0">
-            <a:schemeClr val="accent1"/>
-          </a:fillRef>
-          <a:effectRef idx="0">
-            <a:schemeClr val="accent1"/>
-          </a:effectRef>
-          <a:fontRef idx="minor">
-            <a:schemeClr val="tx1"/>
-          </a:fontRef>
-        </p:style>
-      </p:cxnSp>
-      <p:cxnSp>
-        <p:nvCxnSpPr>
-          <p:cNvPr id="59" name="Straight Connector 58"/>
-          <p:cNvCxnSpPr/>
-          <p:nvPr/>
-        </p:nvCxnSpPr>
-        <p:spPr>
-          <a:xfrm flipV="1">
-            <a:off x="3943573" y="3625057"/>
-            <a:ext cx="821932" cy="2"/>
-          </a:xfrm>
-          <a:prstGeom prst="line">
-            <a:avLst/>
-          </a:prstGeom>
-          <a:ln w="19050">
-            <a:headEnd type="none"/>
-            <a:tailEnd type="oval"/>
-          </a:ln>
-        </p:spPr>
-        <p:style>
-          <a:lnRef idx="1">
-            <a:schemeClr val="accent1"/>
-          </a:lnRef>
-          <a:fillRef idx="0">
-            <a:schemeClr val="accent1"/>
-          </a:fillRef>
-          <a:effectRef idx="0">
-            <a:schemeClr val="accent1"/>
-          </a:effectRef>
-          <a:fontRef idx="minor">
-            <a:schemeClr val="tx1"/>
-          </a:fontRef>
-        </p:style>
-      </p:cxnSp>
-      <p:cxnSp>
-        <p:nvCxnSpPr>
-          <p:cNvPr id="60" name="Straight Connector 59"/>
-          <p:cNvCxnSpPr/>
-          <p:nvPr/>
-        </p:nvCxnSpPr>
-        <p:spPr>
-          <a:xfrm rot="16200000" flipH="1">
-            <a:off x="3363081" y="5541163"/>
-            <a:ext cx="1181532" cy="4"/>
-          </a:xfrm>
-          <a:prstGeom prst="line">
-            <a:avLst/>
-          </a:prstGeom>
-          <a:ln w="19050">
-            <a:headEnd type="oval"/>
-            <a:tailEnd type="oval"/>
-          </a:ln>
-        </p:spPr>
-        <p:style>
-          <a:lnRef idx="1">
-            <a:schemeClr val="accent1"/>
-          </a:lnRef>
-          <a:fillRef idx="0">
-            <a:schemeClr val="accent1"/>
-          </a:fillRef>
-          <a:effectRef idx="0">
-            <a:schemeClr val="accent1"/>
-          </a:effectRef>
-          <a:fontRef idx="minor">
-            <a:schemeClr val="tx1"/>
-          </a:fontRef>
-        </p:style>
-      </p:cxnSp>
-      <p:cxnSp>
-        <p:nvCxnSpPr>
-          <p:cNvPr id="61" name="Straight Connector 60"/>
-          <p:cNvCxnSpPr/>
-          <p:nvPr/>
-        </p:nvCxnSpPr>
-        <p:spPr>
-          <a:xfrm>
-            <a:off x="3964121" y="5145611"/>
-            <a:ext cx="823636" cy="0"/>
-          </a:xfrm>
-          <a:prstGeom prst="line">
-            <a:avLst/>
-          </a:prstGeom>
-          <a:ln w="19050">
-            <a:headEnd type="none"/>
-            <a:tailEnd type="oval"/>
-          </a:ln>
-        </p:spPr>
-        <p:style>
-          <a:lnRef idx="1">
-            <a:schemeClr val="accent1"/>
-          </a:lnRef>
-          <a:fillRef idx="0">
-            <a:schemeClr val="accent1"/>
-          </a:fillRef>
-          <a:effectRef idx="0">
-            <a:schemeClr val="accent1"/>
-          </a:effectRef>
-          <a:fontRef idx="minor">
-            <a:schemeClr val="tx1"/>
-          </a:fontRef>
-        </p:style>
-      </p:cxnSp>
-      <p:cxnSp>
-        <p:nvCxnSpPr>
-          <p:cNvPr id="62" name="Straight Connector 61"/>
-          <p:cNvCxnSpPr/>
-          <p:nvPr/>
-        </p:nvCxnSpPr>
-        <p:spPr>
-          <a:xfrm flipV="1">
-            <a:off x="3962411" y="5832257"/>
-            <a:ext cx="821932" cy="2"/>
-          </a:xfrm>
-          <a:prstGeom prst="line">
-            <a:avLst/>
-          </a:prstGeom>
-          <a:ln w="19050">
-            <a:headEnd type="none"/>
-            <a:tailEnd type="oval"/>
-          </a:ln>
-        </p:spPr>
-        <p:style>
-          <a:lnRef idx="1">
-            <a:schemeClr val="accent1"/>
-          </a:lnRef>
-          <a:fillRef idx="0">
-            <a:schemeClr val="accent1"/>
-          </a:fillRef>
-          <a:effectRef idx="0">
-            <a:schemeClr val="accent1"/>
-          </a:effectRef>
-          <a:fontRef idx="minor">
-            <a:schemeClr val="tx1"/>
-          </a:fontRef>
-        </p:style>
-      </p:cxnSp>
-      <p:sp>
-        <p:nvSpPr>
-          <p:cNvPr id="64" name="TextBox 63"/>
-          <p:cNvSpPr txBox="1"/>
-          <p:nvPr/>
-        </p:nvSpPr>
-        <p:spPr>
-          <a:xfrm>
-            <a:off x="4839128" y="2774023"/>
-            <a:ext cx="976045" cy="369332"/>
-          </a:xfrm>
-          <a:prstGeom prst="rect">
-            <a:avLst/>
-          </a:prstGeom>
-          <a:noFill/>
-        </p:spPr>
-        <p:txBody>
-          <a:bodyPr wrap="square" rtlCol="0">
-            <a:spAutoFit/>
-          </a:bodyPr>
-          <a:lstStyle/>
-          <a:p>
-            <a:r>
-              <a:rPr lang="en-US" dirty="0" smtClean="0"/>
-              <a:t>Firefox</a:t>
-            </a:r>
-            <a:endParaRPr lang="en-US" dirty="0"/>
-          </a:p>
-        </p:txBody>
-      </p:sp>
-      <p:sp>
-        <p:nvSpPr>
-          <p:cNvPr id="65" name="TextBox 64"/>
-          <p:cNvSpPr txBox="1"/>
-          <p:nvPr/>
-        </p:nvSpPr>
-        <p:spPr>
-          <a:xfrm>
-            <a:off x="4837417" y="3419582"/>
-            <a:ext cx="976045" cy="369332"/>
-          </a:xfrm>
-          <a:prstGeom prst="rect">
-            <a:avLst/>
-          </a:prstGeom>
-          <a:noFill/>
-        </p:spPr>
-        <p:txBody>
-          <a:bodyPr wrap="square" rtlCol="0">
-            <a:spAutoFit/>
-          </a:bodyPr>
-          <a:lstStyle/>
-          <a:p>
-            <a:r>
-              <a:rPr lang="en-US" dirty="0" smtClean="0"/>
-              <a:t>Chrome</a:t>
-            </a:r>
-            <a:endParaRPr lang="en-US" dirty="0"/>
-          </a:p>
-        </p:txBody>
-      </p:sp>
-      <p:sp>
-        <p:nvSpPr>
-          <p:cNvPr id="66" name="TextBox 65"/>
-          <p:cNvSpPr txBox="1"/>
-          <p:nvPr/>
-        </p:nvSpPr>
-        <p:spPr>
-          <a:xfrm>
-            <a:off x="2710662" y="2998346"/>
-            <a:ext cx="1152421" cy="646331"/>
-          </a:xfrm>
-          <a:prstGeom prst="rect">
-            <a:avLst/>
-          </a:prstGeom>
-        </p:spPr>
-        <p:style>
-          <a:lnRef idx="3">
-            <a:schemeClr val="lt1"/>
-          </a:lnRef>
-          <a:fillRef idx="1">
-            <a:schemeClr val="accent1"/>
-          </a:fillRef>
-          <a:effectRef idx="1">
-            <a:schemeClr val="accent1"/>
-          </a:effectRef>
-          <a:fontRef idx="minor">
-            <a:schemeClr val="lt1"/>
-          </a:fontRef>
-        </p:style>
-        <p:txBody>
-          <a:bodyPr wrap="square" rtlCol="0">
-            <a:spAutoFit/>
-          </a:bodyPr>
-          <a:lstStyle/>
-          <a:p>
-            <a:pPr algn="ctr"/>
-            <a:r>
-              <a:rPr lang="en-US" dirty="0" smtClean="0"/>
-              <a:t>Multiclass SVM</a:t>
-            </a:r>
-            <a:endParaRPr lang="en-US" dirty="0"/>
-          </a:p>
-        </p:txBody>
-      </p:sp>
-      <p:sp>
-        <p:nvSpPr>
-          <p:cNvPr id="67" name="TextBox 66"/>
-          <p:cNvSpPr txBox="1"/>
-          <p:nvPr/>
-        </p:nvSpPr>
-        <p:spPr>
-          <a:xfrm>
-            <a:off x="2719224" y="5174747"/>
-            <a:ext cx="1152421" cy="646331"/>
-          </a:xfrm>
-          <a:prstGeom prst="rect">
-            <a:avLst/>
-          </a:prstGeom>
-        </p:spPr>
-        <p:style>
-          <a:lnRef idx="3">
-            <a:schemeClr val="lt1"/>
-          </a:lnRef>
-          <a:fillRef idx="1">
-            <a:schemeClr val="accent1"/>
-          </a:fillRef>
-          <a:effectRef idx="1">
-            <a:schemeClr val="accent1"/>
-          </a:effectRef>
-          <a:fontRef idx="minor">
-            <a:schemeClr val="lt1"/>
-          </a:fontRef>
-        </p:style>
-        <p:txBody>
-          <a:bodyPr wrap="square" rtlCol="0">
-            <a:spAutoFit/>
-          </a:bodyPr>
-          <a:lstStyle/>
-          <a:p>
-            <a:pPr algn="ctr"/>
-            <a:r>
-              <a:rPr lang="en-US" dirty="0" smtClean="0"/>
-              <a:t>Multiclass SVM</a:t>
-            </a:r>
-            <a:endParaRPr lang="en-US" dirty="0"/>
-          </a:p>
-        </p:txBody>
-      </p:sp>
-      <p:sp>
-        <p:nvSpPr>
-          <p:cNvPr id="68" name="TextBox 67"/>
-          <p:cNvSpPr txBox="1"/>
-          <p:nvPr/>
-        </p:nvSpPr>
-        <p:spPr>
-          <a:xfrm rot="16200000">
-            <a:off x="4048019" y="3835075"/>
-            <a:ext cx="549398" cy="523220"/>
-          </a:xfrm>
-          <a:prstGeom prst="rect">
-            <a:avLst/>
-          </a:prstGeom>
-          <a:noFill/>
-        </p:spPr>
-        <p:txBody>
-          <a:bodyPr wrap="square" rtlCol="0">
-            <a:spAutoFit/>
-          </a:bodyPr>
-          <a:lstStyle/>
-          <a:p>
-            <a:r>
-              <a:rPr lang="en-US" sz="2800" dirty="0" smtClean="0"/>
-              <a:t>…</a:t>
-            </a:r>
-            <a:endParaRPr lang="en-US" sz="2800" dirty="0"/>
-          </a:p>
-        </p:txBody>
-      </p:sp>
-      <p:sp>
-        <p:nvSpPr>
           <p:cNvPr id="69" name="TextBox 68"/>
           <p:cNvSpPr txBox="1"/>
           <p:nvPr/>
@@ -6248,58 +5588,14 @@
       </p:sp>
       <p:sp>
         <p:nvSpPr>
-          <p:cNvPr id="72" name="TextBox 71"/>
-          <p:cNvSpPr txBox="1"/>
-          <p:nvPr/>
-        </p:nvSpPr>
-        <p:spPr>
-          <a:xfrm>
-            <a:off x="6349430" y="1291123"/>
-            <a:ext cx="2342507" cy="510778"/>
-          </a:xfrm>
-          <a:prstGeom prst="roundRect">
-            <a:avLst/>
-          </a:prstGeom>
-        </p:spPr>
-        <p:style>
-          <a:lnRef idx="2">
-            <a:schemeClr val="accent1"/>
-          </a:lnRef>
-          <a:fillRef idx="1">
-            <a:schemeClr val="lt1"/>
-          </a:fillRef>
-          <a:effectRef idx="0">
-            <a:schemeClr val="accent1"/>
-          </a:effectRef>
-          <a:fontRef idx="minor">
-            <a:schemeClr val="dk1"/>
-          </a:fontRef>
-        </p:style>
-        <p:txBody>
-          <a:bodyPr wrap="square" rtlCol="0">
-            <a:spAutoFit/>
-          </a:bodyPr>
-          <a:lstStyle/>
-          <a:p>
-            <a:pPr algn="ctr"/>
-            <a:r>
-              <a:rPr lang="en-US" sz="2400" dirty="0" smtClean="0"/>
-              <a:t>Multiclass SVM</a:t>
-            </a:r>
-            <a:endParaRPr lang="en-US" sz="2400" dirty="0"/>
-          </a:p>
-        </p:txBody>
-      </p:sp>
-      <p:sp>
-        <p:nvSpPr>
           <p:cNvPr id="78" name="Rounded Rectangle 77"/>
           <p:cNvSpPr/>
           <p:nvPr/>
         </p:nvSpPr>
         <p:spPr>
           <a:xfrm>
-            <a:off x="6133673" y="1849346"/>
-            <a:ext cx="2856216" cy="4685018"/>
+            <a:off x="6133673" y="1160980"/>
+            <a:ext cx="2856216" cy="5373384"/>
           </a:xfrm>
           <a:prstGeom prst="roundRect">
             <a:avLst/>
@@ -6406,97 +5702,900 @@
           </a:p>
         </p:txBody>
       </p:sp>
-      <p:sp>
-        <p:nvSpPr>
-          <p:cNvPr id="80" name="TextBox 79"/>
+      <p:grpSp>
+        <p:nvGrpSpPr>
+          <p:cNvPr id="48" name="Group 47"/>
+          <p:cNvGrpSpPr/>
+          <p:nvPr/>
+        </p:nvGrpSpPr>
+        <p:grpSpPr>
+          <a:xfrm>
+            <a:off x="126513" y="945230"/>
+            <a:ext cx="5678386" cy="5496673"/>
+            <a:chOff x="136787" y="1160984"/>
+            <a:chExt cx="5678386" cy="5496673"/>
+          </a:xfrm>
+        </p:grpSpPr>
+        <p:sp>
+          <p:nvSpPr>
+            <p:cNvPr id="4" name="TextBox 3"/>
+            <p:cNvSpPr txBox="1"/>
+            <p:nvPr/>
+          </p:nvSpPr>
+          <p:spPr>
+            <a:xfrm>
+              <a:off x="2147303" y="1643865"/>
+              <a:ext cx="986319" cy="369332"/>
+            </a:xfrm>
+            <a:prstGeom prst="rect">
+              <a:avLst/>
+            </a:prstGeom>
+            <a:noFill/>
+          </p:spPr>
+          <p:txBody>
+            <a:bodyPr wrap="square" rtlCol="0">
+              <a:spAutoFit/>
+            </a:bodyPr>
+            <a:lstStyle/>
+            <a:p>
+              <a:r>
+                <a:rPr lang="en-US" dirty="0" smtClean="0"/>
+                <a:t>Browser   </a:t>
+              </a:r>
+              <a:endParaRPr lang="en-US" dirty="0"/>
+            </a:p>
+          </p:txBody>
+        </p:sp>
+        <p:sp>
+          <p:nvSpPr>
+            <p:cNvPr id="9" name="TextBox 8"/>
+            <p:cNvSpPr txBox="1"/>
+            <p:nvPr/>
+          </p:nvSpPr>
+          <p:spPr>
+            <a:xfrm>
+              <a:off x="136787" y="1643866"/>
+              <a:ext cx="534255" cy="369332"/>
+            </a:xfrm>
+            <a:prstGeom prst="rect">
+              <a:avLst/>
+            </a:prstGeom>
+            <a:noFill/>
+          </p:spPr>
+          <p:txBody>
+            <a:bodyPr wrap="square" rtlCol="0">
+              <a:spAutoFit/>
+            </a:bodyPr>
+            <a:lstStyle/>
+            <a:p>
+              <a:r>
+                <a:rPr lang="en-US" dirty="0" err="1" smtClean="0"/>
+                <a:t>Bot</a:t>
+              </a:r>
+              <a:endParaRPr lang="en-US" dirty="0"/>
+            </a:p>
+          </p:txBody>
+        </p:sp>
+        <p:cxnSp>
+          <p:nvCxnSpPr>
+            <p:cNvPr id="22" name="Straight Connector 21"/>
+            <p:cNvCxnSpPr>
+              <a:stCxn id="9" idx="3"/>
+              <a:endCxn id="4" idx="1"/>
+            </p:cNvCxnSpPr>
+            <p:nvPr/>
+          </p:nvCxnSpPr>
+          <p:spPr>
+            <a:xfrm flipV="1">
+              <a:off x="671042" y="1828531"/>
+              <a:ext cx="1476261" cy="1"/>
+            </a:xfrm>
+            <a:prstGeom prst="line">
+              <a:avLst/>
+            </a:prstGeom>
+            <a:ln w="19050">
+              <a:headEnd type="oval"/>
+              <a:tailEnd type="oval"/>
+            </a:ln>
+          </p:spPr>
+          <p:style>
+            <a:lnRef idx="1">
+              <a:schemeClr val="accent1"/>
+            </a:lnRef>
+            <a:fillRef idx="0">
+              <a:schemeClr val="accent1"/>
+            </a:fillRef>
+            <a:effectRef idx="0">
+              <a:schemeClr val="accent1"/>
+            </a:effectRef>
+            <a:fontRef idx="minor">
+              <a:schemeClr val="tx1"/>
+            </a:fontRef>
+          </p:style>
+        </p:cxnSp>
+        <p:cxnSp>
+          <p:nvCxnSpPr>
+            <p:cNvPr id="27" name="Straight Connector 26"/>
+            <p:cNvCxnSpPr>
+              <a:stCxn id="4" idx="2"/>
+            </p:cNvCxnSpPr>
+            <p:nvPr/>
+          </p:nvCxnSpPr>
+          <p:spPr>
+            <a:xfrm rot="16200000" flipH="1">
+              <a:off x="330618" y="4323042"/>
+              <a:ext cx="4644460" cy="24770"/>
+            </a:xfrm>
+            <a:prstGeom prst="line">
+              <a:avLst/>
+            </a:prstGeom>
+            <a:ln w="19050">
+              <a:headEnd type="none"/>
+              <a:tailEnd type="oval"/>
+            </a:ln>
+          </p:spPr>
+          <p:style>
+            <a:lnRef idx="1">
+              <a:schemeClr val="accent1"/>
+            </a:lnRef>
+            <a:fillRef idx="0">
+              <a:schemeClr val="accent1"/>
+            </a:fillRef>
+            <a:effectRef idx="0">
+              <a:schemeClr val="accent1"/>
+            </a:effectRef>
+            <a:fontRef idx="minor">
+              <a:schemeClr val="tx1"/>
+            </a:fontRef>
+          </p:style>
+        </p:cxnSp>
+        <p:cxnSp>
+          <p:nvCxnSpPr>
+            <p:cNvPr id="29" name="Straight Connector 28"/>
+            <p:cNvCxnSpPr/>
+            <p:nvPr/>
+          </p:nvCxnSpPr>
+          <p:spPr>
+            <a:xfrm>
+              <a:off x="2661013" y="2753477"/>
+              <a:ext cx="1284270" cy="0"/>
+            </a:xfrm>
+            <a:prstGeom prst="line">
+              <a:avLst/>
+            </a:prstGeom>
+            <a:ln w="19050">
+              <a:headEnd type="none"/>
+              <a:tailEnd type="oval"/>
+            </a:ln>
+          </p:spPr>
+          <p:style>
+            <a:lnRef idx="1">
+              <a:schemeClr val="accent1"/>
+            </a:lnRef>
+            <a:fillRef idx="0">
+              <a:schemeClr val="accent1"/>
+            </a:fillRef>
+            <a:effectRef idx="0">
+              <a:schemeClr val="accent1"/>
+            </a:effectRef>
+            <a:fontRef idx="minor">
+              <a:schemeClr val="tx1"/>
+            </a:fontRef>
+          </p:style>
+        </p:cxnSp>
+        <p:cxnSp>
+          <p:nvCxnSpPr>
+            <p:cNvPr id="31" name="Straight Connector 30"/>
+            <p:cNvCxnSpPr/>
+            <p:nvPr/>
+          </p:nvCxnSpPr>
+          <p:spPr>
+            <a:xfrm>
+              <a:off x="2669575" y="4940142"/>
+              <a:ext cx="1284270" cy="0"/>
+            </a:xfrm>
+            <a:prstGeom prst="line">
+              <a:avLst/>
+            </a:prstGeom>
+            <a:ln w="19050">
+              <a:headEnd type="none"/>
+              <a:tailEnd type="oval"/>
+            </a:ln>
+          </p:spPr>
+          <p:style>
+            <a:lnRef idx="1">
+              <a:schemeClr val="accent1"/>
+            </a:lnRef>
+            <a:fillRef idx="0">
+              <a:schemeClr val="accent1"/>
+            </a:fillRef>
+            <a:effectRef idx="0">
+              <a:schemeClr val="accent1"/>
+            </a:effectRef>
+            <a:fontRef idx="minor">
+              <a:schemeClr val="tx1"/>
+            </a:fontRef>
+          </p:style>
+        </p:cxnSp>
+        <p:sp>
+          <p:nvSpPr>
+            <p:cNvPr id="32" name="TextBox 31"/>
+            <p:cNvSpPr txBox="1"/>
+            <p:nvPr/>
+          </p:nvSpPr>
+          <p:spPr>
+            <a:xfrm>
+              <a:off x="1058843" y="1160984"/>
+              <a:ext cx="914400" cy="369332"/>
+            </a:xfrm>
+            <a:prstGeom prst="rect">
+              <a:avLst/>
+            </a:prstGeom>
+            <a:noFill/>
+          </p:spPr>
+          <p:txBody>
+            <a:bodyPr wrap="square" rtlCol="0">
+              <a:spAutoFit/>
+            </a:bodyPr>
+            <a:lstStyle/>
+            <a:p>
+              <a:r>
+                <a:rPr lang="en-US" dirty="0" smtClean="0"/>
+                <a:t>Type</a:t>
+              </a:r>
+              <a:endParaRPr lang="en-US" dirty="0"/>
+            </a:p>
+          </p:txBody>
+        </p:sp>
+        <p:cxnSp>
+          <p:nvCxnSpPr>
+            <p:cNvPr id="34" name="Straight Connector 33"/>
+            <p:cNvCxnSpPr/>
+            <p:nvPr/>
+          </p:nvCxnSpPr>
+          <p:spPr>
+            <a:xfrm rot="5400000">
+              <a:off x="1236020" y="1679826"/>
+              <a:ext cx="297952" cy="0"/>
+            </a:xfrm>
+            <a:prstGeom prst="line">
+              <a:avLst/>
+            </a:prstGeom>
+            <a:ln w="19050">
+              <a:headEnd type="none"/>
+              <a:tailEnd type="none"/>
+            </a:ln>
+          </p:spPr>
+          <p:style>
+            <a:lnRef idx="1">
+              <a:schemeClr val="accent1"/>
+            </a:lnRef>
+            <a:fillRef idx="0">
+              <a:schemeClr val="accent1"/>
+            </a:fillRef>
+            <a:effectRef idx="0">
+              <a:schemeClr val="accent1"/>
+            </a:effectRef>
+            <a:fontRef idx="minor">
+              <a:schemeClr val="tx1"/>
+            </a:fontRef>
+          </p:style>
+        </p:cxnSp>
+        <p:sp>
+          <p:nvSpPr>
+            <p:cNvPr id="39" name="TextBox 38"/>
+            <p:cNvSpPr txBox="1"/>
+            <p:nvPr/>
+          </p:nvSpPr>
+          <p:spPr>
+            <a:xfrm>
+              <a:off x="2905883" y="2433265"/>
+              <a:ext cx="914400" cy="369332"/>
+            </a:xfrm>
+            <a:prstGeom prst="rect">
+              <a:avLst/>
+            </a:prstGeom>
+            <a:noFill/>
+          </p:spPr>
+          <p:txBody>
+            <a:bodyPr wrap="square" rtlCol="0">
+              <a:spAutoFit/>
+            </a:bodyPr>
+            <a:lstStyle/>
+            <a:p>
+              <a:r>
+                <a:rPr lang="en-US" dirty="0" smtClean="0"/>
+                <a:t>Family</a:t>
+              </a:r>
+              <a:endParaRPr lang="en-US" dirty="0"/>
+            </a:p>
+          </p:txBody>
+        </p:sp>
+        <p:sp>
+          <p:nvSpPr>
+            <p:cNvPr id="40" name="TextBox 39"/>
+            <p:cNvSpPr txBox="1"/>
+            <p:nvPr/>
+          </p:nvSpPr>
+          <p:spPr>
+            <a:xfrm>
+              <a:off x="3048007" y="4599392"/>
+              <a:ext cx="914400" cy="369332"/>
+            </a:xfrm>
+            <a:prstGeom prst="rect">
+              <a:avLst/>
+            </a:prstGeom>
+            <a:noFill/>
+          </p:spPr>
+          <p:txBody>
+            <a:bodyPr wrap="square" rtlCol="0">
+              <a:spAutoFit/>
+            </a:bodyPr>
+            <a:lstStyle/>
+            <a:p>
+              <a:r>
+                <a:rPr lang="en-US" dirty="0" smtClean="0"/>
+                <a:t>OS</a:t>
+              </a:r>
+              <a:endParaRPr lang="en-US" dirty="0"/>
+            </a:p>
+          </p:txBody>
+        </p:sp>
+        <p:cxnSp>
+          <p:nvCxnSpPr>
+            <p:cNvPr id="42" name="Straight Connector 41"/>
+            <p:cNvCxnSpPr/>
+            <p:nvPr/>
+          </p:nvCxnSpPr>
+          <p:spPr>
+            <a:xfrm rot="16200000" flipH="1">
+              <a:off x="3354517" y="3333963"/>
+              <a:ext cx="1181532" cy="4"/>
+            </a:xfrm>
+            <a:prstGeom prst="line">
+              <a:avLst/>
+            </a:prstGeom>
+            <a:ln w="19050">
+              <a:headEnd type="oval"/>
+              <a:tailEnd type="oval"/>
+            </a:ln>
+          </p:spPr>
+          <p:style>
+            <a:lnRef idx="1">
+              <a:schemeClr val="accent1"/>
+            </a:lnRef>
+            <a:fillRef idx="0">
+              <a:schemeClr val="accent1"/>
+            </a:fillRef>
+            <a:effectRef idx="0">
+              <a:schemeClr val="accent1"/>
+            </a:effectRef>
+            <a:fontRef idx="minor">
+              <a:schemeClr val="tx1"/>
+            </a:fontRef>
+          </p:style>
+        </p:cxnSp>
+        <p:cxnSp>
+          <p:nvCxnSpPr>
+            <p:cNvPr id="49" name="Straight Connector 48"/>
+            <p:cNvCxnSpPr/>
+            <p:nvPr/>
+          </p:nvCxnSpPr>
+          <p:spPr>
+            <a:xfrm>
+              <a:off x="3955557" y="2938411"/>
+              <a:ext cx="811652" cy="0"/>
+            </a:xfrm>
+            <a:prstGeom prst="line">
+              <a:avLst/>
+            </a:prstGeom>
+            <a:ln w="19050">
+              <a:headEnd type="none"/>
+              <a:tailEnd type="oval"/>
+            </a:ln>
+          </p:spPr>
+          <p:style>
+            <a:lnRef idx="1">
+              <a:schemeClr val="accent1"/>
+            </a:lnRef>
+            <a:fillRef idx="0">
+              <a:schemeClr val="accent1"/>
+            </a:fillRef>
+            <a:effectRef idx="0">
+              <a:schemeClr val="accent1"/>
+            </a:effectRef>
+            <a:fontRef idx="minor">
+              <a:schemeClr val="tx1"/>
+            </a:fontRef>
+          </p:style>
+        </p:cxnSp>
+        <p:cxnSp>
+          <p:nvCxnSpPr>
+            <p:cNvPr id="59" name="Straight Connector 58"/>
+            <p:cNvCxnSpPr/>
+            <p:nvPr/>
+          </p:nvCxnSpPr>
+          <p:spPr>
+            <a:xfrm flipV="1">
+              <a:off x="3943573" y="3625057"/>
+              <a:ext cx="821932" cy="2"/>
+            </a:xfrm>
+            <a:prstGeom prst="line">
+              <a:avLst/>
+            </a:prstGeom>
+            <a:ln w="19050">
+              <a:headEnd type="none"/>
+              <a:tailEnd type="oval"/>
+            </a:ln>
+          </p:spPr>
+          <p:style>
+            <a:lnRef idx="1">
+              <a:schemeClr val="accent1"/>
+            </a:lnRef>
+            <a:fillRef idx="0">
+              <a:schemeClr val="accent1"/>
+            </a:fillRef>
+            <a:effectRef idx="0">
+              <a:schemeClr val="accent1"/>
+            </a:effectRef>
+            <a:fontRef idx="minor">
+              <a:schemeClr val="tx1"/>
+            </a:fontRef>
+          </p:style>
+        </p:cxnSp>
+        <p:cxnSp>
+          <p:nvCxnSpPr>
+            <p:cNvPr id="60" name="Straight Connector 59"/>
+            <p:cNvCxnSpPr/>
+            <p:nvPr/>
+          </p:nvCxnSpPr>
+          <p:spPr>
+            <a:xfrm rot="16200000" flipH="1">
+              <a:off x="3363081" y="5541163"/>
+              <a:ext cx="1181532" cy="4"/>
+            </a:xfrm>
+            <a:prstGeom prst="line">
+              <a:avLst/>
+            </a:prstGeom>
+            <a:ln w="19050">
+              <a:headEnd type="oval"/>
+              <a:tailEnd type="oval"/>
+            </a:ln>
+          </p:spPr>
+          <p:style>
+            <a:lnRef idx="1">
+              <a:schemeClr val="accent1"/>
+            </a:lnRef>
+            <a:fillRef idx="0">
+              <a:schemeClr val="accent1"/>
+            </a:fillRef>
+            <a:effectRef idx="0">
+              <a:schemeClr val="accent1"/>
+            </a:effectRef>
+            <a:fontRef idx="minor">
+              <a:schemeClr val="tx1"/>
+            </a:fontRef>
+          </p:style>
+        </p:cxnSp>
+        <p:cxnSp>
+          <p:nvCxnSpPr>
+            <p:cNvPr id="61" name="Straight Connector 60"/>
+            <p:cNvCxnSpPr/>
+            <p:nvPr/>
+          </p:nvCxnSpPr>
+          <p:spPr>
+            <a:xfrm>
+              <a:off x="3964121" y="5145611"/>
+              <a:ext cx="823636" cy="0"/>
+            </a:xfrm>
+            <a:prstGeom prst="line">
+              <a:avLst/>
+            </a:prstGeom>
+            <a:ln w="19050">
+              <a:headEnd type="none"/>
+              <a:tailEnd type="oval"/>
+            </a:ln>
+          </p:spPr>
+          <p:style>
+            <a:lnRef idx="1">
+              <a:schemeClr val="accent1"/>
+            </a:lnRef>
+            <a:fillRef idx="0">
+              <a:schemeClr val="accent1"/>
+            </a:fillRef>
+            <a:effectRef idx="0">
+              <a:schemeClr val="accent1"/>
+            </a:effectRef>
+            <a:fontRef idx="minor">
+              <a:schemeClr val="tx1"/>
+            </a:fontRef>
+          </p:style>
+        </p:cxnSp>
+        <p:cxnSp>
+          <p:nvCxnSpPr>
+            <p:cNvPr id="62" name="Straight Connector 61"/>
+            <p:cNvCxnSpPr/>
+            <p:nvPr/>
+          </p:nvCxnSpPr>
+          <p:spPr>
+            <a:xfrm flipV="1">
+              <a:off x="3962411" y="5832257"/>
+              <a:ext cx="821932" cy="2"/>
+            </a:xfrm>
+            <a:prstGeom prst="line">
+              <a:avLst/>
+            </a:prstGeom>
+            <a:ln w="19050">
+              <a:headEnd type="none"/>
+              <a:tailEnd type="oval"/>
+            </a:ln>
+          </p:spPr>
+          <p:style>
+            <a:lnRef idx="1">
+              <a:schemeClr val="accent1"/>
+            </a:lnRef>
+            <a:fillRef idx="0">
+              <a:schemeClr val="accent1"/>
+            </a:fillRef>
+            <a:effectRef idx="0">
+              <a:schemeClr val="accent1"/>
+            </a:effectRef>
+            <a:fontRef idx="minor">
+              <a:schemeClr val="tx1"/>
+            </a:fontRef>
+          </p:style>
+        </p:cxnSp>
+        <p:sp>
+          <p:nvSpPr>
+            <p:cNvPr id="64" name="TextBox 63"/>
+            <p:cNvSpPr txBox="1"/>
+            <p:nvPr/>
+          </p:nvSpPr>
+          <p:spPr>
+            <a:xfrm>
+              <a:off x="4839128" y="2774023"/>
+              <a:ext cx="976045" cy="369332"/>
+            </a:xfrm>
+            <a:prstGeom prst="rect">
+              <a:avLst/>
+            </a:prstGeom>
+            <a:noFill/>
+          </p:spPr>
+          <p:txBody>
+            <a:bodyPr wrap="square" rtlCol="0">
+              <a:spAutoFit/>
+            </a:bodyPr>
+            <a:lstStyle/>
+            <a:p>
+              <a:r>
+                <a:rPr lang="en-US" dirty="0" smtClean="0"/>
+                <a:t>Firefox</a:t>
+              </a:r>
+              <a:endParaRPr lang="en-US" dirty="0"/>
+            </a:p>
+          </p:txBody>
+        </p:sp>
+        <p:sp>
+          <p:nvSpPr>
+            <p:cNvPr id="65" name="TextBox 64"/>
+            <p:cNvSpPr txBox="1"/>
+            <p:nvPr/>
+          </p:nvSpPr>
+          <p:spPr>
+            <a:xfrm>
+              <a:off x="4837417" y="3419582"/>
+              <a:ext cx="976045" cy="369332"/>
+            </a:xfrm>
+            <a:prstGeom prst="rect">
+              <a:avLst/>
+            </a:prstGeom>
+            <a:noFill/>
+          </p:spPr>
+          <p:txBody>
+            <a:bodyPr wrap="square" rtlCol="0">
+              <a:spAutoFit/>
+            </a:bodyPr>
+            <a:lstStyle/>
+            <a:p>
+              <a:r>
+                <a:rPr lang="en-US" dirty="0" smtClean="0"/>
+                <a:t>Chrome</a:t>
+              </a:r>
+              <a:endParaRPr lang="en-US" dirty="0"/>
+            </a:p>
+          </p:txBody>
+        </p:sp>
+        <p:sp>
+          <p:nvSpPr>
+            <p:cNvPr id="66" name="TextBox 65"/>
+            <p:cNvSpPr txBox="1"/>
+            <p:nvPr/>
+          </p:nvSpPr>
+          <p:spPr>
+            <a:xfrm>
+              <a:off x="2710662" y="2998346"/>
+              <a:ext cx="1152421" cy="646331"/>
+            </a:xfrm>
+            <a:prstGeom prst="rect">
+              <a:avLst/>
+            </a:prstGeom>
+          </p:spPr>
+          <p:style>
+            <a:lnRef idx="3">
+              <a:schemeClr val="lt1"/>
+            </a:lnRef>
+            <a:fillRef idx="1">
+              <a:schemeClr val="accent1"/>
+            </a:fillRef>
+            <a:effectRef idx="1">
+              <a:schemeClr val="accent1"/>
+            </a:effectRef>
+            <a:fontRef idx="minor">
+              <a:schemeClr val="lt1"/>
+            </a:fontRef>
+          </p:style>
+          <p:txBody>
+            <a:bodyPr wrap="square" rtlCol="0">
+              <a:spAutoFit/>
+            </a:bodyPr>
+            <a:lstStyle/>
+            <a:p>
+              <a:pPr algn="ctr"/>
+              <a:r>
+                <a:rPr lang="en-US" dirty="0" smtClean="0"/>
+                <a:t>Multiclass SVM</a:t>
+              </a:r>
+              <a:endParaRPr lang="en-US" dirty="0"/>
+            </a:p>
+          </p:txBody>
+        </p:sp>
+        <p:sp>
+          <p:nvSpPr>
+            <p:cNvPr id="67" name="TextBox 66"/>
+            <p:cNvSpPr txBox="1"/>
+            <p:nvPr/>
+          </p:nvSpPr>
+          <p:spPr>
+            <a:xfrm>
+              <a:off x="2719224" y="5174747"/>
+              <a:ext cx="1152421" cy="646331"/>
+            </a:xfrm>
+            <a:prstGeom prst="rect">
+              <a:avLst/>
+            </a:prstGeom>
+          </p:spPr>
+          <p:style>
+            <a:lnRef idx="3">
+              <a:schemeClr val="lt1"/>
+            </a:lnRef>
+            <a:fillRef idx="1">
+              <a:schemeClr val="accent1"/>
+            </a:fillRef>
+            <a:effectRef idx="1">
+              <a:schemeClr val="accent1"/>
+            </a:effectRef>
+            <a:fontRef idx="minor">
+              <a:schemeClr val="lt1"/>
+            </a:fontRef>
+          </p:style>
+          <p:txBody>
+            <a:bodyPr wrap="square" rtlCol="0">
+              <a:spAutoFit/>
+            </a:bodyPr>
+            <a:lstStyle/>
+            <a:p>
+              <a:pPr algn="ctr"/>
+              <a:r>
+                <a:rPr lang="en-US" dirty="0" smtClean="0"/>
+                <a:t>Multiclass SVM</a:t>
+              </a:r>
+              <a:endParaRPr lang="en-US" dirty="0"/>
+            </a:p>
+          </p:txBody>
+        </p:sp>
+        <p:sp>
+          <p:nvSpPr>
+            <p:cNvPr id="68" name="TextBox 67"/>
+            <p:cNvSpPr txBox="1"/>
+            <p:nvPr/>
+          </p:nvSpPr>
+          <p:spPr>
+            <a:xfrm rot="16200000">
+              <a:off x="4048019" y="3835075"/>
+              <a:ext cx="549398" cy="523220"/>
+            </a:xfrm>
+            <a:prstGeom prst="rect">
+              <a:avLst/>
+            </a:prstGeom>
+            <a:noFill/>
+          </p:spPr>
+          <p:txBody>
+            <a:bodyPr wrap="square" rtlCol="0">
+              <a:spAutoFit/>
+            </a:bodyPr>
+            <a:lstStyle/>
+            <a:p>
+              <a:r>
+                <a:rPr lang="en-US" sz="2800" dirty="0" smtClean="0"/>
+                <a:t>…</a:t>
+              </a:r>
+              <a:endParaRPr lang="en-US" sz="2800" dirty="0"/>
+            </a:p>
+          </p:txBody>
+        </p:sp>
+        <p:sp>
+          <p:nvSpPr>
+            <p:cNvPr id="80" name="TextBox 79"/>
+            <p:cNvSpPr txBox="1"/>
+            <p:nvPr/>
+          </p:nvSpPr>
+          <p:spPr>
+            <a:xfrm rot="16200000">
+              <a:off x="4046306" y="6073129"/>
+              <a:ext cx="549398" cy="523220"/>
+            </a:xfrm>
+            <a:prstGeom prst="rect">
+              <a:avLst/>
+            </a:prstGeom>
+            <a:noFill/>
+          </p:spPr>
+          <p:txBody>
+            <a:bodyPr wrap="square" rtlCol="0">
+              <a:spAutoFit/>
+            </a:bodyPr>
+            <a:lstStyle/>
+            <a:p>
+              <a:r>
+                <a:rPr lang="en-US" sz="2800" dirty="0" smtClean="0"/>
+                <a:t>…</a:t>
+              </a:r>
+              <a:endParaRPr lang="en-US" sz="2800" dirty="0"/>
+            </a:p>
+          </p:txBody>
+        </p:sp>
+        <p:cxnSp>
+          <p:nvCxnSpPr>
+            <p:cNvPr id="37" name="Straight Connector 36"/>
+            <p:cNvCxnSpPr/>
+            <p:nvPr/>
+          </p:nvCxnSpPr>
+          <p:spPr>
+            <a:xfrm rot="5400000">
+              <a:off x="1026464" y="2164976"/>
+              <a:ext cx="690283" cy="1"/>
+            </a:xfrm>
+            <a:prstGeom prst="line">
+              <a:avLst/>
+            </a:prstGeom>
+            <a:ln w="19050">
+              <a:headEnd type="none"/>
+              <a:tailEnd type="oval"/>
+            </a:ln>
+          </p:spPr>
+          <p:style>
+            <a:lnRef idx="1">
+              <a:schemeClr val="accent1"/>
+            </a:lnRef>
+            <a:fillRef idx="0">
+              <a:schemeClr val="accent1"/>
+            </a:fillRef>
+            <a:effectRef idx="0">
+              <a:schemeClr val="accent1"/>
+            </a:effectRef>
+            <a:fontRef idx="minor">
+              <a:schemeClr val="tx1"/>
+            </a:fontRef>
+          </p:style>
+        </p:cxnSp>
+        <p:sp>
+          <p:nvSpPr>
+            <p:cNvPr id="36" name="TextBox 35"/>
+            <p:cNvSpPr txBox="1"/>
+            <p:nvPr/>
+          </p:nvSpPr>
+          <p:spPr>
+            <a:xfrm>
+              <a:off x="828070" y="1608820"/>
+              <a:ext cx="1152421" cy="646331"/>
+            </a:xfrm>
+            <a:prstGeom prst="rect">
+              <a:avLst/>
+            </a:prstGeom>
+          </p:spPr>
+          <p:style>
+            <a:lnRef idx="3">
+              <a:schemeClr val="lt1"/>
+            </a:lnRef>
+            <a:fillRef idx="1">
+              <a:schemeClr val="accent1"/>
+            </a:fillRef>
+            <a:effectRef idx="1">
+              <a:schemeClr val="accent1"/>
+            </a:effectRef>
+            <a:fontRef idx="minor">
+              <a:schemeClr val="lt1"/>
+            </a:fontRef>
+          </p:style>
+          <p:txBody>
+            <a:bodyPr wrap="square" rtlCol="0">
+              <a:spAutoFit/>
+            </a:bodyPr>
+            <a:lstStyle/>
+            <a:p>
+              <a:pPr algn="ctr"/>
+              <a:r>
+                <a:rPr lang="en-US" dirty="0" smtClean="0"/>
+                <a:t>Multiclass SVM</a:t>
+              </a:r>
+              <a:endParaRPr lang="en-US" dirty="0"/>
+            </a:p>
+          </p:txBody>
+        </p:sp>
+        <p:sp>
+          <p:nvSpPr>
+            <p:cNvPr id="47" name="TextBox 46"/>
+            <p:cNvSpPr txBox="1"/>
+            <p:nvPr/>
+          </p:nvSpPr>
+          <p:spPr>
+            <a:xfrm>
+              <a:off x="600638" y="2554941"/>
+              <a:ext cx="1721224" cy="369332"/>
+            </a:xfrm>
+            <a:prstGeom prst="rect">
+              <a:avLst/>
+            </a:prstGeom>
+            <a:noFill/>
+          </p:spPr>
+          <p:txBody>
+            <a:bodyPr wrap="square" rtlCol="0">
+              <a:spAutoFit/>
+            </a:bodyPr>
+            <a:lstStyle/>
+            <a:p>
+              <a:r>
+                <a:rPr lang="en-US" dirty="0" smtClean="0"/>
+                <a:t>Mobile Browser</a:t>
+              </a:r>
+              <a:endParaRPr lang="en-US" dirty="0"/>
+            </a:p>
+          </p:txBody>
+        </p:sp>
+      </p:grpSp>
+      <p:sp>
+        <p:nvSpPr>
+          <p:cNvPr id="72" name="TextBox 71"/>
           <p:cNvSpPr txBox="1"/>
           <p:nvPr/>
         </p:nvSpPr>
         <p:spPr>
-          <a:xfrm rot="16200000">
-            <a:off x="4046306" y="6073129"/>
-            <a:ext cx="549398" cy="523220"/>
+          <a:xfrm>
+            <a:off x="6339156" y="1424685"/>
+            <a:ext cx="2342507" cy="510778"/>
           </a:xfrm>
-          <a:prstGeom prst="rect">
+          <a:prstGeom prst="roundRect">
             <a:avLst/>
           </a:prstGeom>
-          <a:noFill/>
-        </p:spPr>
-        <p:txBody>
-          <a:bodyPr wrap="square" rtlCol="0">
-            <a:spAutoFit/>
-          </a:bodyPr>
-          <a:lstStyle/>
-          <a:p>
-            <a:r>
-              <a:rPr lang="en-US" sz="2800" dirty="0" smtClean="0"/>
-              <a:t>…</a:t>
-            </a:r>
-            <a:endParaRPr lang="en-US" sz="2800" dirty="0"/>
-          </a:p>
-        </p:txBody>
-      </p:sp>
-      <p:cxnSp>
-        <p:nvCxnSpPr>
-          <p:cNvPr id="37" name="Straight Connector 36"/>
-          <p:cNvCxnSpPr/>
-          <p:nvPr/>
-        </p:nvCxnSpPr>
-        <p:spPr>
-          <a:xfrm rot="5400000">
-            <a:off x="1026464" y="2164976"/>
-            <a:ext cx="690283" cy="1"/>
-          </a:xfrm>
-          <a:prstGeom prst="line">
-            <a:avLst/>
-          </a:prstGeom>
-          <a:ln w="19050">
-            <a:headEnd type="none"/>
-            <a:tailEnd type="oval"/>
-          </a:ln>
+          <a:effectLst>
+            <a:outerShdw blurRad="50800" dist="38100" dir="2700000" algn="tl" rotWithShape="0">
+              <a:prstClr val="black">
+                <a:alpha val="40000"/>
+              </a:prstClr>
+            </a:outerShdw>
+          </a:effectLst>
         </p:spPr>
         <p:style>
-          <a:lnRef idx="1">
+          <a:lnRef idx="2">
             <a:schemeClr val="accent1"/>
           </a:lnRef>
-          <a:fillRef idx="0">
-            <a:schemeClr val="accent1"/>
+          <a:fillRef idx="1">
+            <a:schemeClr val="lt1"/>
           </a:fillRef>
           <a:effectRef idx="0">
             <a:schemeClr val="accent1"/>
           </a:effectRef>
           <a:fontRef idx="minor">
-            <a:schemeClr val="tx1"/>
-          </a:fontRef>
-        </p:style>
-      </p:cxnSp>
-      <p:sp>
-        <p:nvSpPr>
-          <p:cNvPr id="36" name="TextBox 35"/>
-          <p:cNvSpPr txBox="1"/>
-          <p:nvPr/>
-        </p:nvSpPr>
-        <p:spPr>
-          <a:xfrm>
-            <a:off x="828070" y="1608820"/>
-            <a:ext cx="1152421" cy="646331"/>
-          </a:xfrm>
-          <a:prstGeom prst="rect">
-            <a:avLst/>
-          </a:prstGeom>
-        </p:spPr>
-        <p:style>
-          <a:lnRef idx="3">
-            <a:schemeClr val="lt1"/>
-          </a:lnRef>
-          <a:fillRef idx="1">
-            <a:schemeClr val="accent1"/>
-          </a:fillRef>
-          <a:effectRef idx="1">
-            <a:schemeClr val="accent1"/>
-          </a:effectRef>
-          <a:fontRef idx="minor">
-            <a:schemeClr val="lt1"/>
+            <a:schemeClr val="dk1"/>
           </a:fontRef>
         </p:style>
         <p:txBody>
@@ -6507,40 +6606,10 @@
           <a:p>
             <a:pPr algn="ctr"/>
             <a:r>
-              <a:rPr lang="en-US" dirty="0" smtClean="0"/>
+              <a:rPr lang="en-US" sz="2400" dirty="0" smtClean="0"/>
               <a:t>Multiclass SVM</a:t>
             </a:r>
-            <a:endParaRPr lang="en-US" dirty="0"/>
-          </a:p>
-        </p:txBody>
-      </p:sp>
-      <p:sp>
-        <p:nvSpPr>
-          <p:cNvPr id="47" name="TextBox 46"/>
-          <p:cNvSpPr txBox="1"/>
-          <p:nvPr/>
-        </p:nvSpPr>
-        <p:spPr>
-          <a:xfrm>
-            <a:off x="600638" y="2554941"/>
-            <a:ext cx="1721224" cy="369332"/>
-          </a:xfrm>
-          <a:prstGeom prst="rect">
-            <a:avLst/>
-          </a:prstGeom>
-          <a:noFill/>
-        </p:spPr>
-        <p:txBody>
-          <a:bodyPr wrap="square" rtlCol="0">
-            <a:spAutoFit/>
-          </a:bodyPr>
-          <a:lstStyle/>
-          <a:p>
-            <a:r>
-              <a:rPr lang="en-US" dirty="0" smtClean="0"/>
-              <a:t>Mobile Browser</a:t>
-            </a:r>
-            <a:endParaRPr lang="en-US" dirty="0"/>
+            <a:endParaRPr lang="en-US" sz="2400" dirty="0"/>
           </a:p>
         </p:txBody>
       </p:sp>
@@ -6581,8 +6650,8 @@
         </p:nvSpPr>
         <p:spPr>
           <a:xfrm>
-            <a:off x="502024" y="0"/>
-            <a:ext cx="3917576" cy="1143000"/>
+            <a:off x="358187" y="0"/>
+            <a:ext cx="3917576" cy="947791"/>
           </a:xfrm>
         </p:spPr>
         <p:txBody>
@@ -6593,36 +6662,6 @@
             <a:r>
               <a:rPr lang="en-US" dirty="0" smtClean="0"/>
               <a:t>Results</a:t>
-            </a:r>
-            <a:endParaRPr lang="en-US" dirty="0"/>
-          </a:p>
-        </p:txBody>
-      </p:sp>
-      <p:sp>
-        <p:nvSpPr>
-          <p:cNvPr id="3" name="Content Placeholder 2"/>
-          <p:cNvSpPr>
-            <a:spLocks noGrp="1"/>
-          </p:cNvSpPr>
-          <p:nvPr>
-            <p:ph idx="1"/>
-          </p:nvPr>
-        </p:nvSpPr>
-        <p:spPr>
-          <a:xfrm>
-            <a:off x="-1" y="936814"/>
-            <a:ext cx="8059271" cy="1313328"/>
-          </a:xfrm>
-        </p:spPr>
-        <p:txBody>
-          <a:bodyPr>
-            <a:normAutofit fontScale="77500" lnSpcReduction="20000"/>
-          </a:bodyPr>
-          <a:lstStyle/>
-          <a:p>
-            <a:r>
-              <a:rPr lang="en-US" dirty="0" smtClean="0"/>
-              <a:t>For testing purposes, each category under test (chosen from our dataset of &gt;53,000 UA strings) was split, where 80% was used for training and 20% used for testing.</a:t>
             </a:r>
             <a:endParaRPr lang="en-US" dirty="0"/>
           </a:p>
@@ -6637,8 +6676,8 @@
           <p:nvPr/>
         </p:nvGraphicFramePr>
         <p:xfrm>
-          <a:off x="179293" y="1972232"/>
-          <a:ext cx="8633012" cy="2906063"/>
+          <a:off x="179293" y="1396888"/>
+          <a:ext cx="8633012" cy="2086051"/>
         </p:xfrm>
         <a:graphic>
           <a:graphicData uri="http://schemas.openxmlformats.org/drawingml/2006/table">
@@ -6727,7 +6766,7 @@
                   <a:tcPr/>
                 </a:tc>
               </a:tr>
-              <a:tr h="614456">
+              <a:tr h="425462">
                 <a:tc>
                   <a:txBody>
                     <a:bodyPr/>
@@ -6777,7 +6816,7 @@
                   <a:tcPr/>
                 </a:tc>
               </a:tr>
-              <a:tr h="614456">
+              <a:tr h="390418">
                 <a:tc>
                   <a:txBody>
                     <a:bodyPr/>
@@ -6827,7 +6866,7 @@
                   <a:tcPr/>
                 </a:tc>
               </a:tr>
-              <a:tr h="614456">
+              <a:tr h="421240">
                 <a:tc>
                   <a:txBody>
                     <a:bodyPr/>
@@ -6881,7 +6920,7 @@
                   <a:tcPr/>
                 </a:tc>
               </a:tr>
-              <a:tr h="614456">
+              <a:tr h="400692">
                 <a:tc>
                   <a:txBody>
                     <a:bodyPr/>
@@ -6943,8 +6982,8 @@
         </p:nvSpPr>
         <p:spPr>
           <a:xfrm>
-            <a:off x="161365" y="5136771"/>
-            <a:ext cx="8713694" cy="1661993"/>
+            <a:off x="99721" y="5157319"/>
+            <a:ext cx="8713694" cy="1569660"/>
           </a:xfrm>
           <a:prstGeom prst="rect">
             <a:avLst/>
@@ -6958,7 +6997,7 @@
           <a:lstStyle/>
           <a:p>
             <a:r>
-              <a:rPr lang="en-US" sz="2400" dirty="0" smtClean="0">
+              <a:rPr lang="en-US" sz="2400" b="1" dirty="0" smtClean="0">
                 <a:latin typeface="+mj-lt"/>
               </a:rPr>
               <a:t>Conclusions:</a:t>
@@ -6966,20 +7005,160 @@
           </a:p>
           <a:p>
             <a:r>
-              <a:rPr lang="en-US" sz="2400" dirty="0" smtClean="0">
-                <a:latin typeface="+mj-lt"/>
-              </a:rPr>
-              <a:t>	</a:t>
-            </a:r>
-            <a:r>
               <a:rPr lang="en-US" dirty="0" smtClean="0">
                 <a:latin typeface="+mj-lt"/>
               </a:rPr>
-              <a:t>Robust classification possible.  Robots easy to tell from browsers, even with attempts at deception.  Browser and OS are easily classified by Linear classifier.  Edit string and Subsequence Kernels, despite additional complexity over Linear Kernel and inclusion of position and order information, do not outperform the linear classifier.  </a:t>
+              <a:t>Robust classification possible.  Robots can be identified, even with some deception.  Browser and OS are easily classified by Linear classifier.  Edit string and subsequence kernels, despite additional complexity over Linear Kernel and inclusion of position and order information, do not outperform the linear classifier.  </a:t>
             </a:r>
             <a:endParaRPr lang="en-US" sz="2400" dirty="0">
               <a:latin typeface="+mj-lt"/>
             </a:endParaRPr>
+          </a:p>
+        </p:txBody>
+      </p:sp>
+      <p:sp>
+        <p:nvSpPr>
+          <p:cNvPr id="9" name="TextBox 8"/>
+          <p:cNvSpPr txBox="1"/>
+          <p:nvPr/>
+        </p:nvSpPr>
+        <p:spPr>
+          <a:xfrm>
+            <a:off x="2630184" y="297954"/>
+            <a:ext cx="6287784" cy="934949"/>
+          </a:xfrm>
+          <a:prstGeom prst="rect">
+            <a:avLst/>
+          </a:prstGeom>
+        </p:spPr>
+        <p:style>
+          <a:lnRef idx="1">
+            <a:schemeClr val="accent3"/>
+          </a:lnRef>
+          <a:fillRef idx="2">
+            <a:schemeClr val="accent3"/>
+          </a:fillRef>
+          <a:effectRef idx="1">
+            <a:schemeClr val="accent3"/>
+          </a:effectRef>
+          <a:fontRef idx="minor">
+            <a:schemeClr val="dk1"/>
+          </a:fontRef>
+        </p:style>
+        <p:txBody>
+          <a:bodyPr wrap="square" rtlCol="0">
+            <a:spAutoFit/>
+          </a:bodyPr>
+          <a:lstStyle/>
+          <a:p>
+            <a:r>
+              <a:rPr lang="en-US" dirty="0" smtClean="0"/>
+              <a:t>For testing purposes, each category under test (chosen from our dataset of &gt;53,000 UA strings) was split, where 80% was used for training and 20% used for testing.</a:t>
+            </a:r>
+            <a:endParaRPr lang="en-US" dirty="0"/>
+          </a:p>
+        </p:txBody>
+      </p:sp>
+      <p:sp>
+        <p:nvSpPr>
+          <p:cNvPr id="10" name="TextBox 9"/>
+          <p:cNvSpPr txBox="1"/>
+          <p:nvPr/>
+        </p:nvSpPr>
+        <p:spPr>
+          <a:xfrm>
+            <a:off x="92468" y="3647328"/>
+            <a:ext cx="8640566" cy="1631216"/>
+          </a:xfrm>
+          <a:prstGeom prst="rect">
+            <a:avLst/>
+          </a:prstGeom>
+          <a:noFill/>
+        </p:spPr>
+        <p:txBody>
+          <a:bodyPr wrap="square" rtlCol="0">
+            <a:spAutoFit/>
+          </a:bodyPr>
+          <a:lstStyle/>
+          <a:p>
+            <a:r>
+              <a:rPr lang="en-US" b="1" dirty="0" smtClean="0"/>
+              <a:t>Examples where many parsers fail, but MAUL works:</a:t>
+            </a:r>
+          </a:p>
+          <a:p>
+            <a:pPr>
+              <a:buFontTx/>
+              <a:buChar char="-"/>
+            </a:pPr>
+            <a:r>
+              <a:rPr lang="en-US" sz="1600" b="1" dirty="0" err="1" smtClean="0"/>
+              <a:t>Bot</a:t>
+            </a:r>
+            <a:r>
+              <a:rPr lang="en-US" sz="1600" b="1" dirty="0" smtClean="0"/>
+              <a:t>:</a:t>
+            </a:r>
+            <a:r>
+              <a:rPr lang="en-US" dirty="0" smtClean="0"/>
+              <a:t> </a:t>
+            </a:r>
+            <a:r>
+              <a:rPr lang="en-US" sz="1400" dirty="0" smtClean="0"/>
+              <a:t>Mozilla/5.0 (compatible; Butterfly/1.0; +http://labs.topsy.com/butterfly/) Gecko/2009032608 </a:t>
+            </a:r>
+            <a:r>
+              <a:rPr lang="en-US" sz="1400" dirty="0" smtClean="0"/>
+              <a:t>Firefox/3.0.8</a:t>
+            </a:r>
+            <a:endParaRPr lang="en-US" sz="1600" dirty="0" smtClean="0"/>
+          </a:p>
+          <a:p>
+            <a:pPr>
+              <a:buFontTx/>
+              <a:buChar char="-"/>
+            </a:pPr>
+            <a:r>
+              <a:rPr lang="nl-NL" sz="1600" b="1" dirty="0" smtClean="0"/>
+              <a:t>Bot</a:t>
+            </a:r>
+            <a:r>
+              <a:rPr lang="nl-NL" sz="1600" b="1" dirty="0" smtClean="0"/>
+              <a:t>:</a:t>
+            </a:r>
+            <a:r>
+              <a:rPr lang="nl-NL" dirty="0" smtClean="0"/>
+              <a:t> </a:t>
+            </a:r>
+            <a:r>
+              <a:rPr lang="nl-NL" sz="1400" dirty="0" smtClean="0"/>
+              <a:t>ArabyBot (compatible; Mozilla/5.0; GoogleBot; FAST Crawler 6.4; http://www.araby.com;)</a:t>
+            </a:r>
+          </a:p>
+          <a:p>
+            <a:r>
+              <a:rPr lang="en-US" dirty="0" smtClean="0"/>
+              <a:t>-</a:t>
+            </a:r>
+            <a:r>
+              <a:rPr lang="en-US" sz="1600" b="1" dirty="0" smtClean="0"/>
+              <a:t>Browser:</a:t>
+            </a:r>
+            <a:r>
+              <a:rPr lang="en-US" dirty="0" smtClean="0"/>
+              <a:t> </a:t>
+            </a:r>
+            <a:r>
+              <a:rPr lang="nl-NL" sz="1400" dirty="0" smtClean="0"/>
+              <a:t>Googlebot/2.1 (+http://www.googlebot.com/bot.html; MSIE 7.0; Windows NT 5.1; GoogleT5; .NET CLR 2.0.50727; .NET CLR 3.0.4506.2152; .NET CLR 3.5.30729; .NET CLR 1.1.4322</a:t>
+            </a:r>
+            <a:r>
+              <a:rPr lang="nl-NL" sz="1400" dirty="0" smtClean="0"/>
+              <a:t>)</a:t>
+            </a:r>
+          </a:p>
+          <a:p>
+            <a:endParaRPr lang="en-US" sz="1400" dirty="0"/>
           </a:p>
         </p:txBody>
       </p:sp>

</xml_diff>

<commit_message>
report update, still working on my sections
</commit_message>
<xml_diff>
--- a/poster/poster.pptx
+++ b/poster/poster.pptx
@@ -294,7 +294,7 @@
             <a:fld id="{CCC90B2B-2282-494D-9363-5F50C868573E}" type="datetimeFigureOut">
               <a:rPr lang="en-US" smtClean="0"/>
               <a:pPr/>
-              <a:t>12/7/2010</a:t>
+              <a:t>12/8/2010</a:t>
             </a:fld>
             <a:endParaRPr lang="en-US" dirty="0"/>
           </a:p>
@@ -461,7 +461,7 @@
             <a:fld id="{CCC90B2B-2282-494D-9363-5F50C868573E}" type="datetimeFigureOut">
               <a:rPr lang="en-US" smtClean="0"/>
               <a:pPr/>
-              <a:t>12/7/2010</a:t>
+              <a:t>12/8/2010</a:t>
             </a:fld>
             <a:endParaRPr lang="en-US" dirty="0"/>
           </a:p>
@@ -638,7 +638,7 @@
             <a:fld id="{CCC90B2B-2282-494D-9363-5F50C868573E}" type="datetimeFigureOut">
               <a:rPr lang="en-US" smtClean="0"/>
               <a:pPr/>
-              <a:t>12/7/2010</a:t>
+              <a:t>12/8/2010</a:t>
             </a:fld>
             <a:endParaRPr lang="en-US" dirty="0"/>
           </a:p>
@@ -805,7 +805,7 @@
             <a:fld id="{CCC90B2B-2282-494D-9363-5F50C868573E}" type="datetimeFigureOut">
               <a:rPr lang="en-US" smtClean="0"/>
               <a:pPr/>
-              <a:t>12/7/2010</a:t>
+              <a:t>12/8/2010</a:t>
             </a:fld>
             <a:endParaRPr lang="en-US" dirty="0"/>
           </a:p>
@@ -1048,7 +1048,7 @@
             <a:fld id="{CCC90B2B-2282-494D-9363-5F50C868573E}" type="datetimeFigureOut">
               <a:rPr lang="en-US" smtClean="0"/>
               <a:pPr/>
-              <a:t>12/7/2010</a:t>
+              <a:t>12/8/2010</a:t>
             </a:fld>
             <a:endParaRPr lang="en-US" dirty="0"/>
           </a:p>
@@ -1333,7 +1333,7 @@
             <a:fld id="{CCC90B2B-2282-494D-9363-5F50C868573E}" type="datetimeFigureOut">
               <a:rPr lang="en-US" smtClean="0"/>
               <a:pPr/>
-              <a:t>12/7/2010</a:t>
+              <a:t>12/8/2010</a:t>
             </a:fld>
             <a:endParaRPr lang="en-US" dirty="0"/>
           </a:p>
@@ -1752,7 +1752,7 @@
             <a:fld id="{CCC90B2B-2282-494D-9363-5F50C868573E}" type="datetimeFigureOut">
               <a:rPr lang="en-US" smtClean="0"/>
               <a:pPr/>
-              <a:t>12/7/2010</a:t>
+              <a:t>12/8/2010</a:t>
             </a:fld>
             <a:endParaRPr lang="en-US" dirty="0"/>
           </a:p>
@@ -1867,7 +1867,7 @@
             <a:fld id="{CCC90B2B-2282-494D-9363-5F50C868573E}" type="datetimeFigureOut">
               <a:rPr lang="en-US" smtClean="0"/>
               <a:pPr/>
-              <a:t>12/7/2010</a:t>
+              <a:t>12/8/2010</a:t>
             </a:fld>
             <a:endParaRPr lang="en-US" dirty="0"/>
           </a:p>
@@ -1959,7 +1959,7 @@
             <a:fld id="{CCC90B2B-2282-494D-9363-5F50C868573E}" type="datetimeFigureOut">
               <a:rPr lang="en-US" smtClean="0"/>
               <a:pPr/>
-              <a:t>12/7/2010</a:t>
+              <a:t>12/8/2010</a:t>
             </a:fld>
             <a:endParaRPr lang="en-US" dirty="0"/>
           </a:p>
@@ -2233,7 +2233,7 @@
             <a:fld id="{CCC90B2B-2282-494D-9363-5F50C868573E}" type="datetimeFigureOut">
               <a:rPr lang="en-US" smtClean="0"/>
               <a:pPr/>
-              <a:t>12/7/2010</a:t>
+              <a:t>12/8/2010</a:t>
             </a:fld>
             <a:endParaRPr lang="en-US" dirty="0"/>
           </a:p>
@@ -2483,7 +2483,7 @@
             <a:fld id="{CCC90B2B-2282-494D-9363-5F50C868573E}" type="datetimeFigureOut">
               <a:rPr lang="en-US" smtClean="0"/>
               <a:pPr/>
-              <a:t>12/7/2010</a:t>
+              <a:t>12/8/2010</a:t>
             </a:fld>
             <a:endParaRPr lang="en-US" dirty="0"/>
           </a:p>
@@ -2693,7 +2693,7 @@
             <a:fld id="{CCC90B2B-2282-494D-9363-5F50C868573E}" type="datetimeFigureOut">
               <a:rPr lang="en-US" smtClean="0"/>
               <a:pPr/>
-              <a:t>12/7/2010</a:t>
+              <a:t>12/8/2010</a:t>
             </a:fld>
             <a:endParaRPr lang="en-US" dirty="0"/>
           </a:p>
@@ -5071,232 +5071,247 @@
           </a:graphicData>
         </a:graphic>
       </p:graphicFrame>
-      <p:sp>
-        <p:nvSpPr>
-          <p:cNvPr id="7" name="TextBox 6"/>
-          <p:cNvSpPr txBox="1"/>
+      <p:grpSp>
+        <p:nvGrpSpPr>
+          <p:cNvPr id="9" name="Group 8"/>
+          <p:cNvGrpSpPr/>
           <p:nvPr/>
-        </p:nvSpPr>
-        <p:spPr>
+        </p:nvGrpSpPr>
+        <p:grpSpPr>
           <a:xfrm>
             <a:off x="152400" y="2529175"/>
-            <a:ext cx="1667435" cy="646331"/>
-          </a:xfrm>
-          <a:prstGeom prst="rect">
-            <a:avLst/>
-          </a:prstGeom>
-          <a:noFill/>
-        </p:spPr>
-        <p:txBody>
-          <a:bodyPr wrap="square" rtlCol="0">
-            <a:spAutoFit/>
-          </a:bodyPr>
-          <a:lstStyle/>
-          <a:p>
-            <a:r>
-              <a:rPr lang="en-US" dirty="0" smtClean="0"/>
-              <a:t>Tokenization Example:</a:t>
-            </a:r>
-            <a:endParaRPr lang="en-US" dirty="0"/>
-          </a:p>
-        </p:txBody>
-      </p:sp>
-      <p:sp>
-        <p:nvSpPr>
-          <p:cNvPr id="8" name="TextBox 7"/>
-          <p:cNvSpPr txBox="1"/>
-          <p:nvPr/>
-        </p:nvSpPr>
-        <p:spPr>
-          <a:xfrm>
-            <a:off x="1868300" y="2573997"/>
-            <a:ext cx="6051177" cy="646331"/>
-          </a:xfrm>
-          <a:prstGeom prst="rect">
-            <a:avLst/>
-          </a:prstGeom>
-          <a:noFill/>
-        </p:spPr>
-        <p:txBody>
-          <a:bodyPr wrap="square" rtlCol="0">
-            <a:spAutoFit/>
-          </a:bodyPr>
-          <a:lstStyle/>
-          <a:p>
-            <a:r>
-              <a:rPr lang="en-US" dirty="0" smtClean="0">
-                <a:solidFill>
-                  <a:srgbClr val="FF0000"/>
-                </a:solidFill>
-              </a:rPr>
-              <a:t>AmigaVoyager</a:t>
-            </a:r>
-            <a:r>
-              <a:rPr lang="en-US" dirty="0" smtClean="0"/>
-              <a:t>/</a:t>
-            </a:r>
-            <a:r>
-              <a:rPr lang="en-US" dirty="0" smtClean="0">
-                <a:solidFill>
-                  <a:schemeClr val="tx2">
-                    <a:lumMod val="60000"/>
-                    <a:lumOff val="40000"/>
-                  </a:schemeClr>
-                </a:solidFill>
-              </a:rPr>
-              <a:t>2</a:t>
-            </a:r>
-            <a:r>
-              <a:rPr lang="en-US" dirty="0" smtClean="0"/>
-              <a:t>.</a:t>
-            </a:r>
-            <a:r>
-              <a:rPr lang="en-US" dirty="0" smtClean="0">
-                <a:solidFill>
-                  <a:schemeClr val="accent6">
-                    <a:lumMod val="75000"/>
-                  </a:schemeClr>
-                </a:solidFill>
-              </a:rPr>
-              <a:t>95</a:t>
-            </a:r>
-            <a:r>
-              <a:rPr lang="en-US" dirty="0" smtClean="0"/>
-              <a:t> (</a:t>
-            </a:r>
-            <a:r>
-              <a:rPr lang="en-US" dirty="0" smtClean="0">
-                <a:solidFill>
-                  <a:srgbClr val="00B050"/>
-                </a:solidFill>
-              </a:rPr>
-              <a:t>compatible</a:t>
-            </a:r>
-            <a:r>
-              <a:rPr lang="en-US" dirty="0" smtClean="0"/>
-              <a:t>; </a:t>
-            </a:r>
-            <a:r>
-              <a:rPr lang="en-US" dirty="0" smtClean="0">
-                <a:solidFill>
-                  <a:schemeClr val="accent4">
-                    <a:lumMod val="75000"/>
-                  </a:schemeClr>
-                </a:solidFill>
-              </a:rPr>
-              <a:t>MC680x0</a:t>
-            </a:r>
-            <a:r>
-              <a:rPr lang="en-US" dirty="0" smtClean="0"/>
-              <a:t>; </a:t>
-            </a:r>
-            <a:r>
-              <a:rPr lang="en-US" dirty="0" smtClean="0">
+            <a:ext cx="7767077" cy="673223"/>
+            <a:chOff x="152400" y="2529175"/>
+            <a:chExt cx="7767077" cy="673223"/>
+          </a:xfrm>
+        </p:grpSpPr>
+        <p:sp>
+          <p:nvSpPr>
+            <p:cNvPr id="7" name="TextBox 6"/>
+            <p:cNvSpPr txBox="1"/>
+            <p:nvPr/>
+          </p:nvSpPr>
+          <p:spPr>
+            <a:xfrm>
+              <a:off x="152400" y="2529175"/>
+              <a:ext cx="1667435" cy="646331"/>
+            </a:xfrm>
+            <a:prstGeom prst="rect">
+              <a:avLst/>
+            </a:prstGeom>
+            <a:noFill/>
+          </p:spPr>
+          <p:txBody>
+            <a:bodyPr wrap="square" rtlCol="0">
+              <a:spAutoFit/>
+            </a:bodyPr>
+            <a:lstStyle/>
+            <a:p>
+              <a:r>
+                <a:rPr lang="en-US" dirty="0" smtClean="0"/>
+                <a:t>Tokenization Example:</a:t>
+              </a:r>
+              <a:endParaRPr lang="en-US" dirty="0"/>
+            </a:p>
+          </p:txBody>
+        </p:sp>
+        <p:sp>
+          <p:nvSpPr>
+            <p:cNvPr id="8" name="TextBox 7"/>
+            <p:cNvSpPr txBox="1"/>
+            <p:nvPr/>
+          </p:nvSpPr>
+          <p:spPr>
+            <a:xfrm>
+              <a:off x="1868300" y="2556067"/>
+              <a:ext cx="6051177" cy="646331"/>
+            </a:xfrm>
+            <a:prstGeom prst="rect">
+              <a:avLst/>
+            </a:prstGeom>
+            <a:noFill/>
+          </p:spPr>
+          <p:txBody>
+            <a:bodyPr wrap="square" rtlCol="0">
+              <a:spAutoFit/>
+            </a:bodyPr>
+            <a:lstStyle/>
+            <a:p>
+              <a:r>
+                <a:rPr lang="en-US" dirty="0" smtClean="0">
+                  <a:solidFill>
+                    <a:srgbClr val="FF0000"/>
+                  </a:solidFill>
+                </a:rPr>
+                <a:t>AmigaVoyager</a:t>
+              </a:r>
+              <a:r>
+                <a:rPr lang="en-US" dirty="0" smtClean="0"/>
+                <a:t>/</a:t>
+              </a:r>
+              <a:r>
+                <a:rPr lang="en-US" dirty="0" smtClean="0">
+                  <a:solidFill>
+                    <a:schemeClr val="tx2">
+                      <a:lumMod val="60000"/>
+                      <a:lumOff val="40000"/>
+                    </a:schemeClr>
+                  </a:solidFill>
+                </a:rPr>
+                <a:t>2</a:t>
+              </a:r>
+              <a:r>
+                <a:rPr lang="en-US" dirty="0" smtClean="0"/>
+                <a:t>.</a:t>
+              </a:r>
+              <a:r>
+                <a:rPr lang="en-US" dirty="0" smtClean="0">
+                  <a:solidFill>
+                    <a:schemeClr val="accent6">
+                      <a:lumMod val="75000"/>
+                    </a:schemeClr>
+                  </a:solidFill>
+                </a:rPr>
+                <a:t>95</a:t>
+              </a:r>
+              <a:r>
+                <a:rPr lang="en-US" dirty="0" smtClean="0"/>
+                <a:t> (</a:t>
+              </a:r>
+              <a:r>
+                <a:rPr lang="en-US" dirty="0" smtClean="0">
+                  <a:solidFill>
+                    <a:srgbClr val="00B050"/>
+                  </a:solidFill>
+                </a:rPr>
+                <a:t>compatible</a:t>
+              </a:r>
+              <a:r>
+                <a:rPr lang="en-US" dirty="0" smtClean="0"/>
+                <a:t>; </a:t>
+              </a:r>
+              <a:r>
+                <a:rPr lang="en-US" dirty="0" smtClean="0">
+                  <a:solidFill>
+                    <a:schemeClr val="accent4">
+                      <a:lumMod val="75000"/>
+                    </a:schemeClr>
+                  </a:solidFill>
+                </a:rPr>
+                <a:t>MC680x0</a:t>
+              </a:r>
+              <a:r>
+                <a:rPr lang="en-US" dirty="0" smtClean="0"/>
+                <a:t>; </a:t>
+              </a:r>
+              <a:r>
+                <a:rPr lang="en-US" dirty="0" smtClean="0">
+                  <a:solidFill>
+                    <a:schemeClr val="bg2">
+                      <a:lumMod val="50000"/>
+                    </a:schemeClr>
+                  </a:solidFill>
+                </a:rPr>
+                <a:t>AmigaOS</a:t>
+              </a:r>
+              <a:r>
+                <a:rPr lang="en-US" dirty="0" smtClean="0"/>
+                <a:t>)</a:t>
+              </a:r>
+            </a:p>
+            <a:p>
+              <a:r>
+                <a:rPr lang="en-US" dirty="0" smtClean="0"/>
+                <a:t>         </a:t>
+              </a:r>
+              <a:r>
+                <a:rPr lang="en-US" dirty="0" smtClean="0">
+                  <a:solidFill>
+                    <a:srgbClr val="FF0000"/>
+                  </a:solidFill>
+                </a:rPr>
+                <a:t>2353</a:t>
+              </a:r>
+              <a:r>
+                <a:rPr lang="en-US" dirty="0" smtClean="0"/>
+                <a:t>         </a:t>
+              </a:r>
+              <a:r>
+                <a:rPr lang="en-US" dirty="0" smtClean="0">
+                  <a:solidFill>
+                    <a:schemeClr val="tx2">
+                      <a:lumMod val="60000"/>
+                      <a:lumOff val="40000"/>
+                    </a:schemeClr>
+                  </a:solidFill>
+                </a:rPr>
+                <a:t>0</a:t>
+              </a:r>
+              <a:r>
+                <a:rPr lang="en-US" dirty="0" smtClean="0"/>
+                <a:t>  </a:t>
+              </a:r>
+              <a:r>
+                <a:rPr lang="en-US" dirty="0" smtClean="0">
+                  <a:solidFill>
+                    <a:schemeClr val="accent6">
+                      <a:lumMod val="75000"/>
+                    </a:schemeClr>
+                  </a:solidFill>
+                </a:rPr>
+                <a:t>10</a:t>
+              </a:r>
+              <a:r>
+                <a:rPr lang="en-US" dirty="0" smtClean="0"/>
+                <a:t>         </a:t>
+              </a:r>
+              <a:r>
+                <a:rPr lang="en-US" dirty="0" smtClean="0">
+                  <a:solidFill>
+                    <a:srgbClr val="00B050"/>
+                  </a:solidFill>
+                </a:rPr>
+                <a:t>8</a:t>
+              </a:r>
+              <a:r>
+                <a:rPr lang="en-US" dirty="0" smtClean="0"/>
+                <a:t>               </a:t>
+              </a:r>
+              <a:r>
+                <a:rPr lang="en-US" dirty="0" smtClean="0">
+                  <a:solidFill>
+                    <a:schemeClr val="accent4">
+                      <a:lumMod val="75000"/>
+                    </a:schemeClr>
+                  </a:solidFill>
+                </a:rPr>
+                <a:t>3348</a:t>
+              </a:r>
+              <a:r>
+                <a:rPr lang="en-US" dirty="0" smtClean="0"/>
+                <a:t>            </a:t>
+              </a:r>
+              <a:r>
+                <a:rPr lang="en-US" dirty="0" smtClean="0">
+                  <a:solidFill>
+                    <a:schemeClr val="bg2">
+                      <a:lumMod val="50000"/>
+                    </a:schemeClr>
+                  </a:solidFill>
+                </a:rPr>
+                <a:t>1045</a:t>
+              </a:r>
+              <a:endParaRPr lang="en-US" dirty="0">
                 <a:solidFill>
                   <a:schemeClr val="bg2">
                     <a:lumMod val="50000"/>
                   </a:schemeClr>
                 </a:solidFill>
-              </a:rPr>
-              <a:t>AmigaOS</a:t>
-            </a:r>
-            <a:r>
-              <a:rPr lang="en-US" dirty="0" smtClean="0"/>
-              <a:t>)</a:t>
-            </a:r>
-          </a:p>
-          <a:p>
-            <a:r>
-              <a:rPr lang="en-US" dirty="0" smtClean="0"/>
-              <a:t>         </a:t>
-            </a:r>
-            <a:r>
-              <a:rPr lang="en-US" dirty="0" smtClean="0">
-                <a:solidFill>
-                  <a:srgbClr val="FF0000"/>
-                </a:solidFill>
-              </a:rPr>
-              <a:t>2353</a:t>
-            </a:r>
-            <a:r>
-              <a:rPr lang="en-US" dirty="0" smtClean="0"/>
-              <a:t>         </a:t>
-            </a:r>
-            <a:r>
-              <a:rPr lang="en-US" dirty="0" smtClean="0">
-                <a:solidFill>
-                  <a:schemeClr val="tx2">
-                    <a:lumMod val="60000"/>
-                    <a:lumOff val="40000"/>
-                  </a:schemeClr>
-                </a:solidFill>
-              </a:rPr>
-              <a:t>0</a:t>
-            </a:r>
-            <a:r>
-              <a:rPr lang="en-US" dirty="0" smtClean="0"/>
-              <a:t>  </a:t>
-            </a:r>
-            <a:r>
-              <a:rPr lang="en-US" dirty="0" smtClean="0">
-                <a:solidFill>
-                  <a:schemeClr val="accent6">
-                    <a:lumMod val="75000"/>
-                  </a:schemeClr>
-                </a:solidFill>
-              </a:rPr>
-              <a:t>10</a:t>
-            </a:r>
-            <a:r>
-              <a:rPr lang="en-US" dirty="0" smtClean="0"/>
-              <a:t>         </a:t>
-            </a:r>
-            <a:r>
-              <a:rPr lang="en-US" dirty="0" smtClean="0">
-                <a:solidFill>
-                  <a:srgbClr val="00B050"/>
-                </a:solidFill>
-              </a:rPr>
-              <a:t>8</a:t>
-            </a:r>
-            <a:r>
-              <a:rPr lang="en-US" dirty="0" smtClean="0"/>
-              <a:t>               </a:t>
-            </a:r>
-            <a:r>
-              <a:rPr lang="en-US" dirty="0" smtClean="0">
-                <a:solidFill>
-                  <a:schemeClr val="accent4">
-                    <a:lumMod val="75000"/>
-                  </a:schemeClr>
-                </a:solidFill>
-              </a:rPr>
-              <a:t>3348</a:t>
-            </a:r>
-            <a:r>
-              <a:rPr lang="en-US" dirty="0" smtClean="0"/>
-              <a:t>            </a:t>
-            </a:r>
-            <a:r>
-              <a:rPr lang="en-US" dirty="0" smtClean="0">
-                <a:solidFill>
-                  <a:schemeClr val="bg2">
-                    <a:lumMod val="50000"/>
-                  </a:schemeClr>
-                </a:solidFill>
-              </a:rPr>
-              <a:t>1045</a:t>
-            </a:r>
-            <a:endParaRPr lang="en-US" dirty="0">
-              <a:solidFill>
-                <a:schemeClr val="bg2">
-                  <a:lumMod val="50000"/>
-                </a:schemeClr>
-              </a:solidFill>
-            </a:endParaRPr>
-          </a:p>
-        </p:txBody>
-      </p:sp>
+              </a:endParaRPr>
+            </a:p>
+          </p:txBody>
+        </p:sp>
+      </p:grpSp>
     </p:spTree>
   </p:cSld>
   <p:clrMapOvr>

</xml_diff>